<commit_message>
Project presentation file modification
</commit_message>
<xml_diff>
--- a/Final Project-SoccorAnalyser-Group4.pptx
+++ b/Final Project-SoccorAnalyser-Group4.pptx
@@ -15,11 +15,10 @@
     <p:sldId id="263" r:id="rId9"/>
     <p:sldId id="264" r:id="rId10"/>
     <p:sldId id="265" r:id="rId11"/>
-    <p:sldId id="266" r:id="rId12"/>
-    <p:sldId id="267" r:id="rId13"/>
-    <p:sldId id="268" r:id="rId14"/>
-    <p:sldId id="269" r:id="rId15"/>
-    <p:sldId id="270" r:id="rId16"/>
+    <p:sldId id="271" r:id="rId12"/>
+    <p:sldId id="269" r:id="rId13"/>
+    <p:sldId id="272" r:id="rId14"/>
+    <p:sldId id="270" r:id="rId15"/>
   </p:sldIdLst>
   <p:sldSz cx="12192000" cy="6858000"/>
   <p:notesSz cx="6858000" cy="9144000"/>
@@ -353,7 +352,7 @@
             <a:fld id="{B61BEF0D-F0BB-DE4B-95CE-6DB70DBA9567}" type="datetimeFigureOut">
               <a:rPr lang="en-US" smtClean="0"/>
               <a:pPr/>
-              <a:t>9/26/2023</a:t>
+              <a:t>9/27/2023</a:t>
             </a:fld>
             <a:endParaRPr lang="en-US" dirty="0"/>
           </a:p>
@@ -563,7 +562,7 @@
             <a:fld id="{B61BEF0D-F0BB-DE4B-95CE-6DB70DBA9567}" type="datetimeFigureOut">
               <a:rPr lang="en-US" smtClean="0"/>
               <a:pPr/>
-              <a:t>9/26/2023</a:t>
+              <a:t>9/27/2023</a:t>
             </a:fld>
             <a:endParaRPr lang="en-US" dirty="0"/>
           </a:p>
@@ -821,7 +820,7 @@
             <a:fld id="{B61BEF0D-F0BB-DE4B-95CE-6DB70DBA9567}" type="datetimeFigureOut">
               <a:rPr lang="en-US" smtClean="0"/>
               <a:pPr/>
-              <a:t>9/26/2023</a:t>
+              <a:t>9/27/2023</a:t>
             </a:fld>
             <a:endParaRPr lang="en-US" dirty="0"/>
           </a:p>
@@ -997,7 +996,7 @@
             <a:fld id="{B61BEF0D-F0BB-DE4B-95CE-6DB70DBA9567}" type="datetimeFigureOut">
               <a:rPr lang="en-US" smtClean="0"/>
               <a:pPr/>
-              <a:t>9/26/2023</a:t>
+              <a:t>9/27/2023</a:t>
             </a:fld>
             <a:endParaRPr lang="en-US" dirty="0"/>
           </a:p>
@@ -1342,7 +1341,7 @@
             <a:fld id="{B61BEF0D-F0BB-DE4B-95CE-6DB70DBA9567}" type="datetimeFigureOut">
               <a:rPr lang="en-US" smtClean="0"/>
               <a:pPr/>
-              <a:t>9/26/2023</a:t>
+              <a:t>9/27/2023</a:t>
             </a:fld>
             <a:endParaRPr lang="en-US" dirty="0"/>
           </a:p>
@@ -1619,7 +1618,7 @@
             <a:fld id="{B61BEF0D-F0BB-DE4B-95CE-6DB70DBA9567}" type="datetimeFigureOut">
               <a:rPr lang="en-US" smtClean="0"/>
               <a:pPr/>
-              <a:t>9/26/2023</a:t>
+              <a:t>9/27/2023</a:t>
             </a:fld>
             <a:endParaRPr lang="en-US" dirty="0"/>
           </a:p>
@@ -2000,7 +1999,7 @@
             <a:fld id="{B61BEF0D-F0BB-DE4B-95CE-6DB70DBA9567}" type="datetimeFigureOut">
               <a:rPr lang="en-US" smtClean="0"/>
               <a:pPr/>
-              <a:t>9/26/2023</a:t>
+              <a:t>9/27/2023</a:t>
             </a:fld>
             <a:endParaRPr lang="en-US" dirty="0"/>
           </a:p>
@@ -2120,7 +2119,7 @@
             <a:fld id="{B61BEF0D-F0BB-DE4B-95CE-6DB70DBA9567}" type="datetimeFigureOut">
               <a:rPr lang="en-US" smtClean="0"/>
               <a:pPr/>
-              <a:t>9/26/2023</a:t>
+              <a:t>9/27/2023</a:t>
             </a:fld>
             <a:endParaRPr lang="en-US" dirty="0"/>
           </a:p>
@@ -2293,7 +2292,7 @@
             <a:fld id="{B61BEF0D-F0BB-DE4B-95CE-6DB70DBA9567}" type="datetimeFigureOut">
               <a:rPr lang="en-US" smtClean="0"/>
               <a:pPr/>
-              <a:t>9/26/2023</a:t>
+              <a:t>9/27/2023</a:t>
             </a:fld>
             <a:endParaRPr lang="en-US" dirty="0"/>
           </a:p>
@@ -2649,7 +2648,7 @@
             <a:fld id="{B61BEF0D-F0BB-DE4B-95CE-6DB70DBA9567}" type="datetimeFigureOut">
               <a:rPr lang="en-US" smtClean="0"/>
               <a:pPr/>
-              <a:t>9/26/2023</a:t>
+              <a:t>9/27/2023</a:t>
             </a:fld>
             <a:endParaRPr lang="en-US" dirty="0"/>
           </a:p>
@@ -3033,7 +3032,7 @@
             <a:fld id="{B61BEF0D-F0BB-DE4B-95CE-6DB70DBA9567}" type="datetimeFigureOut">
               <a:rPr lang="en-US" smtClean="0"/>
               <a:pPr/>
-              <a:t>9/26/2023</a:t>
+              <a:t>9/27/2023</a:t>
             </a:fld>
             <a:endParaRPr lang="en-US" dirty="0"/>
           </a:p>
@@ -3322,7 +3321,7 @@
             <a:fld id="{B61BEF0D-F0BB-DE4B-95CE-6DB70DBA9567}" type="datetimeFigureOut">
               <a:rPr lang="en-US" smtClean="0"/>
               <a:pPr/>
-              <a:t>9/26/2023</a:t>
+              <a:t>9/27/2023</a:t>
             </a:fld>
             <a:endParaRPr lang="en-US" dirty="0"/>
           </a:p>
@@ -4017,7 +4016,7 @@
           <a:p>
             <a:r>
               <a:rPr lang="en-US" dirty="0"/>
-              <a:t>Demo steps</a:t>
+              <a:t>Project execution steps</a:t>
             </a:r>
           </a:p>
         </p:txBody>
@@ -4035,7 +4034,7 @@
         <p:spPr/>
         <p:txBody>
           <a:bodyPr>
-            <a:normAutofit/>
+            <a:normAutofit fontScale="92500" lnSpcReduction="10000"/>
           </a:bodyPr>
           <a:lstStyle/>
           <a:p>
@@ -4044,7 +4043,7 @@
             </a:pPr>
             <a:r>
               <a:rPr lang="en-GB" b="1" dirty="0"/>
-              <a:t>Step 1:</a:t>
+              <a:t>Step 1(Data preparation):</a:t>
             </a:r>
           </a:p>
           <a:p>
@@ -4087,21 +4086,7 @@
             </a:pPr>
             <a:r>
               <a:rPr lang="en-GB" dirty="0"/>
-              <a:t>Downloaded static dataset related to </a:t>
-            </a:r>
-            <a:r>
-              <a:rPr lang="en-GB"/>
-              <a:t>international football</a:t>
-            </a:r>
-            <a:endParaRPr lang="en-GB" b="1" dirty="0"/>
-          </a:p>
-          <a:p>
-            <a:pPr marL="292608" lvl="1" indent="0">
-              <a:buNone/>
-            </a:pPr>
-            <a:r>
-              <a:rPr lang="en-US" b="1" dirty="0"/>
-              <a:t>Step 2:</a:t>
+              <a:t>Downloaded static dataset related to international football</a:t>
             </a:r>
           </a:p>
           <a:p>
@@ -4110,22 +4095,53 @@
               <a:buChar char="v"/>
             </a:pPr>
             <a:r>
-              <a:rPr lang="en-US" dirty="0"/>
-              <a:t>Download Kafka from </a:t>
-            </a:r>
-            <a:r>
-              <a:rPr lang="en-US" dirty="0">
-                <a:solidFill>
-                  <a:srgbClr val="46ABEE"/>
-                </a:solidFill>
-                <a:uFill>
-                  <a:noFill/>
-                </a:uFill>
-                <a:hlinkClick r:id="rId2"/>
+              <a:rPr lang="en-US" b="0" i="0" dirty="0">
+                <a:solidFill>
+                  <a:srgbClr val="1F2328"/>
+                </a:solidFill>
+                <a:effectLst/>
+                <a:latin typeface="-apple-system"/>
               </a:rPr>
-              <a:t>https://archive.apache.org/dist/kafka/</a:t>
-            </a:r>
-            <a:endParaRPr lang="en-US" dirty="0"/>
+              <a:t>split the dataset into smaller files so that we can apply data streaming and processing operations</a:t>
+            </a:r>
+          </a:p>
+          <a:p>
+            <a:pPr marL="292608" lvl="1" indent="0">
+              <a:buNone/>
+            </a:pPr>
+            <a:r>
+              <a:rPr lang="en-US" b="0" i="0" dirty="0">
+                <a:solidFill>
+                  <a:srgbClr val="1F2328"/>
+                </a:solidFill>
+                <a:effectLst/>
+                <a:latin typeface="-apple-system"/>
+              </a:rPr>
+              <a:t> </a:t>
+            </a:r>
+          </a:p>
+          <a:p>
+            <a:pPr marL="292608" lvl="1" indent="0">
+              <a:buNone/>
+            </a:pPr>
+            <a:r>
+              <a:rPr lang="en-US" b="1" dirty="0"/>
+              <a:t>Step 2(</a:t>
+            </a:r>
+            <a:r>
+              <a:rPr lang="en-US" b="1" i="0" dirty="0">
+                <a:solidFill>
+                  <a:srgbClr val="1F2328"/>
+                </a:solidFill>
+                <a:effectLst/>
+                <a:latin typeface="-apple-system"/>
+              </a:rPr>
+              <a:t>Data feed to Apache Spark Data Streaming )</a:t>
+            </a:r>
+            <a:r>
+              <a:rPr lang="en-US" b="1" dirty="0"/>
+              <a:t>:</a:t>
+            </a:r>
           </a:p>
           <a:p>
             <a:pPr marL="578358" lvl="1" indent="-285750">
@@ -4133,17 +4149,110 @@
               <a:buChar char="v"/>
             </a:pPr>
             <a:r>
-              <a:rPr lang="en-US" dirty="0"/>
-              <a:t>Extract at opt </a:t>
-            </a:r>
-            <a:r>
-              <a:rPr lang="en-US" dirty="0">
-                <a:solidFill>
-                  <a:srgbClr val="46ABEE"/>
-                </a:solidFill>
+              <a:rPr lang="en-US" b="0" i="0" dirty="0">
+                <a:solidFill>
+                  <a:srgbClr val="1F2328"/>
+                </a:solidFill>
+                <a:effectLst/>
+                <a:latin typeface="-apple-system"/>
               </a:rPr>
-              <a:t>i.e. /opt/kafka_2.11-1.1.0</a:t>
-            </a:r>
+              <a:t>The pipeline is written in </a:t>
+            </a:r>
+            <a:r>
+              <a:rPr lang="en-US" b="0" i="0" dirty="0" err="1">
+                <a:solidFill>
+                  <a:srgbClr val="1F2328"/>
+                </a:solidFill>
+                <a:effectLst/>
+                <a:latin typeface="-apple-system"/>
+              </a:rPr>
+              <a:t>shellscript</a:t>
+            </a:r>
+            <a:r>
+              <a:rPr lang="en-US" b="0" i="0" dirty="0">
+                <a:solidFill>
+                  <a:srgbClr val="1F2328"/>
+                </a:solidFill>
+                <a:effectLst/>
+                <a:latin typeface="-apple-system"/>
+              </a:rPr>
+              <a:t> </a:t>
+            </a:r>
+            <a:r>
+              <a:rPr lang="en-US" b="0" i="0" dirty="0" err="1">
+                <a:solidFill>
+                  <a:srgbClr val="1F2328"/>
+                </a:solidFill>
+                <a:effectLst/>
+                <a:latin typeface="-apple-system"/>
+              </a:rPr>
+              <a:t>iwhich</a:t>
+            </a:r>
+            <a:r>
+              <a:rPr lang="en-US" b="0" i="0" dirty="0">
+                <a:solidFill>
+                  <a:srgbClr val="1F2328"/>
+                </a:solidFill>
+                <a:effectLst/>
+                <a:latin typeface="-apple-system"/>
+              </a:rPr>
+              <a:t> fetch data from local directory in </a:t>
+            </a:r>
+            <a:r>
+              <a:rPr lang="en-US" b="0" i="0" dirty="0" err="1">
+                <a:solidFill>
+                  <a:srgbClr val="1F2328"/>
+                </a:solidFill>
+                <a:effectLst/>
+                <a:latin typeface="-apple-system"/>
+              </a:rPr>
+              <a:t>cloudera</a:t>
+            </a:r>
+            <a:r>
+              <a:rPr lang="en-US" b="0" i="0" dirty="0">
+                <a:solidFill>
+                  <a:srgbClr val="1F2328"/>
+                </a:solidFill>
+                <a:effectLst/>
+                <a:latin typeface="-apple-system"/>
+              </a:rPr>
+              <a:t> VM to the Apache Data Streaming in certain interval of time</a:t>
+            </a:r>
+          </a:p>
+          <a:p>
+            <a:pPr marL="292608" lvl="1" indent="0">
+              <a:buNone/>
+            </a:pPr>
+            <a:endParaRPr lang="en-US" b="1" dirty="0"/>
+          </a:p>
+          <a:p>
+            <a:pPr marL="292608" lvl="1" indent="0">
+              <a:buNone/>
+            </a:pPr>
+            <a:r>
+              <a:rPr lang="en-US" b="1" dirty="0"/>
+              <a:t>Step 3(</a:t>
+            </a:r>
+            <a:r>
+              <a:rPr lang="en-US" b="1" i="0" dirty="0">
+                <a:solidFill>
+                  <a:srgbClr val="1F2328"/>
+                </a:solidFill>
+                <a:effectLst/>
+                <a:latin typeface="-apple-system"/>
+              </a:rPr>
+              <a:t>Real-time Analysis with Apache Spark Streaming)</a:t>
+            </a:r>
+            <a:r>
+              <a:rPr lang="en-US" b="1" dirty="0"/>
+              <a:t>:</a:t>
+            </a:r>
+            <a:endParaRPr lang="en-US" dirty="0">
+              <a:solidFill>
+                <a:srgbClr val="1F2328"/>
+              </a:solidFill>
+              <a:latin typeface="-apple-system"/>
+            </a:endParaRPr>
           </a:p>
           <a:p>
             <a:pPr marL="578358" lvl="1" indent="-285750">
@@ -4151,26 +4260,15 @@
               <a:buChar char="v"/>
             </a:pPr>
             <a:r>
-              <a:rPr lang="en-US" dirty="0"/>
-              <a:t>Run Zookeeper : </a:t>
-            </a:r>
-            <a:r>
-              <a:rPr lang="en-US" b="1" dirty="0"/>
-              <a:t>bin/zookeeper-server-start.sh </a:t>
-            </a:r>
-            <a:r>
-              <a:rPr lang="en-US" b="1" dirty="0" err="1"/>
-              <a:t>config</a:t>
-            </a:r>
-            <a:r>
-              <a:rPr lang="en-US" b="1" dirty="0"/>
-              <a:t>/</a:t>
-            </a:r>
-            <a:r>
-              <a:rPr lang="en-US" b="1" dirty="0" err="1"/>
-              <a:t>zookeeper.properties</a:t>
-            </a:r>
-            <a:endParaRPr lang="en-US" b="1" dirty="0"/>
+              <a:rPr lang="en-US" b="0" i="0" dirty="0">
+                <a:solidFill>
+                  <a:srgbClr val="1F2328"/>
+                </a:solidFill>
+                <a:effectLst/>
+                <a:latin typeface="-apple-system"/>
+              </a:rPr>
+              <a:t> Ingest data in every 20 seconds. </a:t>
+            </a:r>
           </a:p>
           <a:p>
             <a:pPr marL="578358" lvl="1" indent="-285750">
@@ -4178,200 +4276,111 @@
               <a:buChar char="v"/>
             </a:pPr>
             <a:r>
-              <a:rPr lang="en-GB" dirty="0"/>
-              <a:t>Since we will have 3 servers, it’s better to maintain 3 configuration files for each server. Copy the </a:t>
-            </a:r>
-            <a:r>
-              <a:rPr lang="en-GB" dirty="0" err="1"/>
-              <a:t>config</a:t>
-            </a:r>
-            <a:r>
-              <a:rPr lang="en-GB" dirty="0"/>
-              <a:t>/</a:t>
-            </a:r>
-            <a:r>
-              <a:rPr lang="en-GB" dirty="0" err="1"/>
-              <a:t>server.properties</a:t>
-            </a:r>
-            <a:r>
-              <a:rPr lang="en-GB" dirty="0"/>
-              <a:t> file and make 3 files for each server instance</a:t>
-            </a:r>
-          </a:p>
-          <a:p>
-            <a:pPr marL="292608" lvl="1" indent="0">
-              <a:buNone/>
+              <a:rPr lang="en-US" b="0" i="0" dirty="0">
+                <a:solidFill>
+                  <a:srgbClr val="1F2328"/>
+                </a:solidFill>
+                <a:effectLst/>
+                <a:latin typeface="-apple-system"/>
+              </a:rPr>
+              <a:t>Text file streaming is used to load data. </a:t>
+            </a:r>
+          </a:p>
+          <a:p>
+            <a:pPr marL="578358" lvl="1" indent="-285750">
+              <a:buFont typeface="Wingdings" panose="05000000000000000000" pitchFamily="2" charset="2"/>
+              <a:buChar char="v"/>
             </a:pPr>
             <a:r>
-              <a:rPr lang="en-GB" dirty="0"/>
-              <a:t>     	</a:t>
-            </a:r>
-            <a:endParaRPr lang="en-US" dirty="0"/>
-          </a:p>
-        </p:txBody>
-      </p:sp>
-      <p:graphicFrame>
-        <p:nvGraphicFramePr>
-          <p:cNvPr id="6" name="Table 5"/>
-          <p:cNvGraphicFramePr>
-            <a:graphicFrameLocks noGrp="1"/>
-          </p:cNvGraphicFramePr>
-          <p:nvPr>
-            <p:extLst>
-              <p:ext uri="{D42A27DB-BD31-4B8C-83A1-F6EECF244321}">
-                <p14:modId xmlns:p14="http://schemas.microsoft.com/office/powerpoint/2010/main" val="2778710944"/>
-              </p:ext>
-            </p:extLst>
-          </p:nvPr>
-        </p:nvGraphicFramePr>
-        <p:xfrm>
-          <a:off x="1592162" y="4979149"/>
-          <a:ext cx="7598137" cy="914400"/>
-        </p:xfrm>
-        <a:graphic>
-          <a:graphicData uri="http://schemas.openxmlformats.org/drawingml/2006/table">
-            <a:tbl>
-              <a:tblPr firstRow="1" bandRow="1">
-                <a:tableStyleId>{D7AC3CCA-C797-4891-BE02-D94E43425B78}</a:tableStyleId>
-              </a:tblPr>
-              <a:tblGrid>
-                <a:gridCol w="7598137">
-                  <a:extLst>
-                    <a:ext uri="{9D8B030D-6E8A-4147-A177-3AD203B41FA5}">
-                      <a16:colId xmlns:a16="http://schemas.microsoft.com/office/drawing/2014/main" val="20000"/>
-                    </a:ext>
-                  </a:extLst>
-                </a:gridCol>
-              </a:tblGrid>
-              <a:tr h="370840">
-                <a:tc>
-                  <a:txBody>
-                    <a:bodyPr/>
-                    <a:lstStyle/>
-                    <a:p>
-                      <a:pPr marL="292608" lvl="1" indent="0">
-                        <a:buNone/>
-                      </a:pPr>
-                      <a:r>
-                        <a:rPr lang="en-US" dirty="0" err="1"/>
-                        <a:t>cp</a:t>
-                      </a:r>
-                      <a:r>
-                        <a:rPr lang="en-US" dirty="0"/>
-                        <a:t> </a:t>
-                      </a:r>
-                      <a:r>
-                        <a:rPr lang="en-US" dirty="0" err="1"/>
-                        <a:t>config</a:t>
-                      </a:r>
-                      <a:r>
-                        <a:rPr lang="en-US" dirty="0"/>
-                        <a:t>/</a:t>
-                      </a:r>
-                      <a:r>
-                        <a:rPr lang="en-US" dirty="0" err="1"/>
-                        <a:t>server.properties</a:t>
-                      </a:r>
-                      <a:r>
-                        <a:rPr lang="en-US" dirty="0"/>
-                        <a:t> </a:t>
-                      </a:r>
-                      <a:r>
-                        <a:rPr lang="en-US" dirty="0" err="1"/>
-                        <a:t>config</a:t>
-                      </a:r>
-                      <a:r>
-                        <a:rPr lang="en-US" dirty="0"/>
-                        <a:t>/server.1.properties</a:t>
-                      </a:r>
-                    </a:p>
-                    <a:p>
-                      <a:pPr marL="292608" lvl="1" indent="0">
-                        <a:buNone/>
-                      </a:pPr>
-                      <a:r>
-                        <a:rPr lang="en-US" dirty="0" err="1"/>
-                        <a:t>cp</a:t>
-                      </a:r>
-                      <a:r>
-                        <a:rPr lang="en-US" dirty="0"/>
-                        <a:t> </a:t>
-                      </a:r>
-                      <a:r>
-                        <a:rPr lang="en-US" dirty="0" err="1"/>
-                        <a:t>config</a:t>
-                      </a:r>
-                      <a:r>
-                        <a:rPr lang="en-US" dirty="0"/>
-                        <a:t>/</a:t>
-                      </a:r>
-                      <a:r>
-                        <a:rPr lang="en-US" dirty="0" err="1"/>
-                        <a:t>server.properties</a:t>
-                      </a:r>
-                      <a:r>
-                        <a:rPr lang="en-US" dirty="0"/>
-                        <a:t>  </a:t>
-                      </a:r>
-                      <a:r>
-                        <a:rPr lang="en-US" dirty="0" err="1"/>
-                        <a:t>config</a:t>
-                      </a:r>
-                      <a:r>
-                        <a:rPr lang="en-US" dirty="0"/>
-                        <a:t>/server.2.properties</a:t>
-                      </a:r>
-                    </a:p>
-                    <a:p>
-                      <a:pPr marL="292608" lvl="1" indent="0">
-                        <a:buNone/>
-                      </a:pPr>
-                      <a:r>
-                        <a:rPr lang="en-US" dirty="0" err="1"/>
-                        <a:t>cp</a:t>
-                      </a:r>
-                      <a:r>
-                        <a:rPr lang="en-US" dirty="0"/>
-                        <a:t> </a:t>
-                      </a:r>
-                      <a:r>
-                        <a:rPr lang="en-US" dirty="0" err="1"/>
-                        <a:t>config</a:t>
-                      </a:r>
-                      <a:r>
-                        <a:rPr lang="en-US" dirty="0"/>
-                        <a:t>/</a:t>
-                      </a:r>
-                      <a:r>
-                        <a:rPr lang="en-US" dirty="0" err="1"/>
-                        <a:t>server.properties</a:t>
-                      </a:r>
-                      <a:r>
-                        <a:rPr lang="en-US" dirty="0"/>
-                        <a:t> </a:t>
-                      </a:r>
-                      <a:r>
-                        <a:rPr lang="en-US" dirty="0" err="1"/>
-                        <a:t>config</a:t>
-                      </a:r>
-                      <a:r>
-                        <a:rPr lang="en-US" dirty="0"/>
-                        <a:t>/server.3.properties</a:t>
-                      </a:r>
-                    </a:p>
-                  </a:txBody>
-                  <a:tcPr/>
-                </a:tc>
-                <a:extLst>
-                  <a:ext uri="{0D108BD9-81ED-4DB2-BD59-A6C34878D82A}">
-                    <a16:rowId xmlns:a16="http://schemas.microsoft.com/office/drawing/2014/main" val="10000"/>
-                  </a:ext>
-                </a:extLst>
-              </a:tr>
-            </a:tbl>
-          </a:graphicData>
-        </a:graphic>
-      </p:graphicFrame>
+              <a:rPr lang="en-US" b="0" i="0" dirty="0">
+                <a:solidFill>
+                  <a:srgbClr val="1F2328"/>
+                </a:solidFill>
+                <a:effectLst/>
+                <a:latin typeface="-apple-system"/>
+              </a:rPr>
+              <a:t>Different stream function like filter, </a:t>
+            </a:r>
+            <a:r>
+              <a:rPr lang="en-US" b="0" i="0" dirty="0" err="1">
+                <a:solidFill>
+                  <a:srgbClr val="1F2328"/>
+                </a:solidFill>
+                <a:effectLst/>
+                <a:latin typeface="-apple-system"/>
+              </a:rPr>
+              <a:t>maptoPair</a:t>
+            </a:r>
+            <a:r>
+              <a:rPr lang="en-US" b="0" i="0" dirty="0">
+                <a:solidFill>
+                  <a:srgbClr val="1F2328"/>
+                </a:solidFill>
+                <a:effectLst/>
+                <a:latin typeface="-apple-system"/>
+              </a:rPr>
+              <a:t>, Union, </a:t>
+            </a:r>
+            <a:r>
+              <a:rPr lang="en-US" b="0" i="0" dirty="0" err="1">
+                <a:solidFill>
+                  <a:srgbClr val="1F2328"/>
+                </a:solidFill>
+                <a:effectLst/>
+                <a:latin typeface="-apple-system"/>
+              </a:rPr>
+              <a:t>reducebykey</a:t>
+            </a:r>
+            <a:r>
+              <a:rPr lang="en-US" b="0" i="0" dirty="0">
+                <a:solidFill>
+                  <a:srgbClr val="1F2328"/>
+                </a:solidFill>
+                <a:effectLst/>
+                <a:latin typeface="-apple-system"/>
+              </a:rPr>
+              <a:t> </a:t>
+            </a:r>
+            <a:r>
+              <a:rPr lang="en-US" b="0" i="0" dirty="0" err="1">
+                <a:solidFill>
+                  <a:srgbClr val="1F2328"/>
+                </a:solidFill>
+                <a:effectLst/>
+                <a:latin typeface="-apple-system"/>
+              </a:rPr>
+              <a:t>etc</a:t>
+            </a:r>
+            <a:r>
+              <a:rPr lang="en-US" b="0" i="0" dirty="0">
+                <a:solidFill>
+                  <a:srgbClr val="1F2328"/>
+                </a:solidFill>
+                <a:effectLst/>
+                <a:latin typeface="-apple-system"/>
+              </a:rPr>
+              <a:t> are used. </a:t>
+            </a:r>
+          </a:p>
+          <a:p>
+            <a:pPr marL="578358" lvl="1" indent="-285750">
+              <a:buFont typeface="Wingdings" panose="05000000000000000000" pitchFamily="2" charset="2"/>
+              <a:buChar char="v"/>
+            </a:pPr>
+            <a:r>
+              <a:rPr lang="en-US" b="0" i="0" dirty="0">
+                <a:solidFill>
+                  <a:srgbClr val="1F2328"/>
+                </a:solidFill>
+                <a:effectLst/>
+                <a:latin typeface="-apple-system"/>
+              </a:rPr>
+              <a:t>complex data structure with multiple Tuple are used to get the aggregate data from input data.</a:t>
+            </a:r>
+            <a:endParaRPr lang="en-US" dirty="0"/>
+          </a:p>
+        </p:txBody>
+      </p:sp>
     </p:spTree>
     <p:extLst>
       <p:ext uri="{BB962C8B-B14F-4D97-AF65-F5344CB8AC3E}">
@@ -4419,7 +4428,7 @@
           <a:p>
             <a:r>
               <a:rPr lang="en-US" dirty="0"/>
-              <a:t>Demo steps (Continue..)</a:t>
+              <a:t>Project execution steps</a:t>
             </a:r>
           </a:p>
         </p:txBody>
@@ -4437,239 +4446,99 @@
         <p:spPr/>
         <p:txBody>
           <a:bodyPr>
-            <a:normAutofit/>
+            <a:normAutofit lnSpcReduction="10000"/>
           </a:bodyPr>
           <a:lstStyle/>
+          <a:p>
+            <a:pPr marL="292608" lvl="1" indent="0">
+              <a:buNone/>
+            </a:pPr>
+            <a:r>
+              <a:rPr lang="en-GB" b="1" dirty="0"/>
+              <a:t>Step 4(</a:t>
+            </a:r>
+            <a:r>
+              <a:rPr lang="en-US" b="1" i="0" dirty="0">
+                <a:solidFill>
+                  <a:srgbClr val="1F2328"/>
+                </a:solidFill>
+                <a:effectLst/>
+                <a:latin typeface="-apple-system"/>
+              </a:rPr>
+              <a:t>Data Processing with Apache Hive</a:t>
+            </a:r>
+            <a:r>
+              <a:rPr lang="en-GB" b="1" dirty="0"/>
+              <a:t>):</a:t>
+            </a:r>
+          </a:p>
           <a:p>
             <a:pPr marL="578358" lvl="1" indent="-285750">
               <a:buFont typeface="Wingdings" panose="05000000000000000000" pitchFamily="2" charset="2"/>
               <a:buChar char="v"/>
             </a:pPr>
             <a:r>
-              <a:rPr lang="en-GB" dirty="0"/>
-              <a:t>Change the above 3 properties for each copy of the file so that they are all unique.</a:t>
-            </a:r>
-            <a:endParaRPr lang="en-US" dirty="0"/>
-          </a:p>
-          <a:p>
-            <a:pPr marL="292608" lvl="1" indent="0">
-              <a:buNone/>
+              <a:rPr lang="en-US" dirty="0"/>
+              <a:t>Schema Definition: Defined a Hive schema that matches the structure of the output result from Apache data streaming</a:t>
+            </a:r>
+          </a:p>
+          <a:p>
+            <a:pPr marL="578358" lvl="1" indent="-285750">
+              <a:buFont typeface="Wingdings" panose="05000000000000000000" pitchFamily="2" charset="2"/>
+              <a:buChar char="v"/>
             </a:pPr>
             <a:endParaRPr lang="en-US" dirty="0"/>
           </a:p>
-        </p:txBody>
-      </p:sp>
-      <p:graphicFrame>
-        <p:nvGraphicFramePr>
-          <p:cNvPr id="5" name="Table 4"/>
-          <p:cNvGraphicFramePr>
-            <a:graphicFrameLocks noGrp="1"/>
-          </p:cNvGraphicFramePr>
-          <p:nvPr>
-            <p:extLst>
-              <p:ext uri="{D42A27DB-BD31-4B8C-83A1-F6EECF244321}">
-                <p14:modId xmlns:p14="http://schemas.microsoft.com/office/powerpoint/2010/main" val="3320113523"/>
-              </p:ext>
-            </p:extLst>
-          </p:nvPr>
-        </p:nvGraphicFramePr>
-        <p:xfrm>
-          <a:off x="1661611" y="2224375"/>
-          <a:ext cx="8128000" cy="3931920"/>
-        </p:xfrm>
-        <a:graphic>
-          <a:graphicData uri="http://schemas.openxmlformats.org/drawingml/2006/table">
-            <a:tbl>
-              <a:tblPr firstRow="1" bandRow="1">
-                <a:tableStyleId>{616DA210-FB5B-4158-B5E0-FEB733F419BA}</a:tableStyleId>
-              </a:tblPr>
-              <a:tblGrid>
-                <a:gridCol w="8128000">
-                  <a:extLst>
-                    <a:ext uri="{9D8B030D-6E8A-4147-A177-3AD203B41FA5}">
-                      <a16:colId xmlns:a16="http://schemas.microsoft.com/office/drawing/2014/main" val="20000"/>
-                    </a:ext>
-                  </a:extLst>
-                </a:gridCol>
-              </a:tblGrid>
-              <a:tr h="449377">
-                <a:tc>
-                  <a:txBody>
-                    <a:bodyPr/>
-                    <a:lstStyle/>
-                    <a:p>
-                      <a:pPr marL="292608" lvl="1" indent="0">
-                        <a:buNone/>
-                      </a:pPr>
-                      <a:r>
-                        <a:rPr lang="en-US" dirty="0"/>
-                        <a:t>server.1.properties</a:t>
-                      </a:r>
-                    </a:p>
-                    <a:p>
-                      <a:pPr marL="292608" lvl="1" indent="0">
-                        <a:buNone/>
-                      </a:pPr>
-                      <a:r>
-                        <a:rPr lang="en-US" dirty="0"/>
-                        <a:t>broker.id=1</a:t>
-                      </a:r>
-                    </a:p>
-                    <a:p>
-                      <a:pPr marL="292608" lvl="1" indent="0">
-                        <a:buNone/>
-                      </a:pPr>
-                      <a:r>
-                        <a:rPr lang="en-US" dirty="0"/>
-                        <a:t>listeners=PLAINTEXT://:9093</a:t>
-                      </a:r>
-                    </a:p>
-                    <a:p>
-                      <a:pPr marL="292608" lvl="1" indent="0">
-                        <a:buNone/>
-                      </a:pPr>
-                      <a:r>
-                        <a:rPr lang="en-US" dirty="0" err="1"/>
-                        <a:t>log.dirs</a:t>
-                      </a:r>
-                      <a:r>
-                        <a:rPr lang="en-US" dirty="0"/>
-                        <a:t>=/</a:t>
-                      </a:r>
-                      <a:r>
-                        <a:rPr lang="en-US" dirty="0" err="1"/>
-                        <a:t>tmp</a:t>
-                      </a:r>
-                      <a:r>
-                        <a:rPr lang="en-US" dirty="0"/>
-                        <a:t>/kafka-logs1</a:t>
-                      </a:r>
-                    </a:p>
-                    <a:p>
-                      <a:pPr marL="292608" lvl="1" indent="0">
-                        <a:buNone/>
-                      </a:pPr>
-                      <a:endParaRPr lang="en-US" dirty="0"/>
-                    </a:p>
-                    <a:p>
-                      <a:pPr marL="292608" lvl="1" indent="0">
-                        <a:buNone/>
-                      </a:pPr>
-                      <a:r>
-                        <a:rPr lang="en-US" dirty="0"/>
-                        <a:t>server.2.properties</a:t>
-                      </a:r>
-                    </a:p>
-                    <a:p>
-                      <a:pPr marL="292608" lvl="1" indent="0">
-                        <a:buNone/>
-                      </a:pPr>
-                      <a:r>
-                        <a:rPr lang="en-US" dirty="0"/>
-                        <a:t>broker.id=2</a:t>
-                      </a:r>
-                    </a:p>
-                    <a:p>
-                      <a:pPr marL="292608" lvl="1" indent="0">
-                        <a:buNone/>
-                      </a:pPr>
-                      <a:r>
-                        <a:rPr lang="en-US" dirty="0"/>
-                        <a:t>listeners=PLAINTEXT://:9094</a:t>
-                      </a:r>
-                    </a:p>
-                    <a:p>
-                      <a:pPr marL="292608" lvl="1" indent="0">
-                        <a:buNone/>
-                      </a:pPr>
-                      <a:r>
-                        <a:rPr lang="en-US" dirty="0" err="1"/>
-                        <a:t>log.dirs</a:t>
-                      </a:r>
-                      <a:r>
-                        <a:rPr lang="en-US" dirty="0"/>
-                        <a:t>=/</a:t>
-                      </a:r>
-                      <a:r>
-                        <a:rPr lang="en-US" dirty="0" err="1"/>
-                        <a:t>tmp</a:t>
-                      </a:r>
-                      <a:r>
-                        <a:rPr lang="en-US" dirty="0"/>
-                        <a:t>/kafka-logs2</a:t>
-                      </a:r>
-                    </a:p>
-                    <a:p>
-                      <a:pPr marL="292608" lvl="1" indent="0">
-                        <a:buNone/>
-                      </a:pPr>
-                      <a:endParaRPr lang="en-US" dirty="0"/>
-                    </a:p>
-                    <a:p>
-                      <a:pPr marL="292608" lvl="1" indent="0">
-                        <a:buNone/>
-                      </a:pPr>
-                      <a:r>
-                        <a:rPr lang="en-US" dirty="0"/>
-                        <a:t>server.3.properties</a:t>
-                      </a:r>
-                    </a:p>
-                    <a:p>
-                      <a:pPr marL="292608" lvl="1" indent="0">
-                        <a:buNone/>
-                      </a:pPr>
-                      <a:r>
-                        <a:rPr lang="en-US" dirty="0"/>
-                        <a:t>broker.id=3</a:t>
-                      </a:r>
-                    </a:p>
-                    <a:p>
-                      <a:pPr marL="292608" lvl="1" indent="0">
-                        <a:buNone/>
-                      </a:pPr>
-                      <a:r>
-                        <a:rPr lang="en-US" dirty="0"/>
-                        <a:t>listeners=PLAINTEXT://:9096</a:t>
-                      </a:r>
-                    </a:p>
-                    <a:p>
-                      <a:pPr marL="292608" lvl="1" indent="0">
-                        <a:buNone/>
-                      </a:pPr>
-                      <a:r>
-                        <a:rPr lang="en-US" dirty="0" err="1"/>
-                        <a:t>log.dirs</a:t>
-                      </a:r>
-                      <a:r>
-                        <a:rPr lang="en-US" dirty="0"/>
-                        <a:t>=/</a:t>
-                      </a:r>
-                      <a:r>
-                        <a:rPr lang="en-US" dirty="0" err="1"/>
-                        <a:t>tmp</a:t>
-                      </a:r>
-                      <a:r>
-                        <a:rPr lang="en-US" dirty="0"/>
-                        <a:t>/kafka-logs3</a:t>
-                      </a:r>
-                    </a:p>
-                  </a:txBody>
-                  <a:tcPr/>
-                </a:tc>
-                <a:extLst>
-                  <a:ext uri="{0D108BD9-81ED-4DB2-BD59-A6C34878D82A}">
-                    <a16:rowId xmlns:a16="http://schemas.microsoft.com/office/drawing/2014/main" val="10000"/>
-                  </a:ext>
-                </a:extLst>
-              </a:tr>
-            </a:tbl>
-          </a:graphicData>
-        </a:graphic>
-      </p:graphicFrame>
+          <a:p>
+            <a:pPr marL="578358" lvl="1" indent="-285750">
+              <a:buFont typeface="Wingdings" panose="05000000000000000000" pitchFamily="2" charset="2"/>
+              <a:buChar char="v"/>
+            </a:pPr>
+            <a:r>
+              <a:rPr lang="en-US" dirty="0"/>
+              <a:t>Data Loading: Load the CSV data into a Hive table using Hive's LOAD DATA command or other methods for bulk data loading.</a:t>
+            </a:r>
+          </a:p>
+          <a:p>
+            <a:pPr marL="578358" lvl="1" indent="-285750">
+              <a:buFont typeface="Wingdings" panose="05000000000000000000" pitchFamily="2" charset="2"/>
+              <a:buChar char="v"/>
+            </a:pPr>
+            <a:endParaRPr lang="en-US" dirty="0"/>
+          </a:p>
+          <a:p>
+            <a:pPr marL="578358" lvl="1" indent="-285750">
+              <a:buFont typeface="Wingdings" panose="05000000000000000000" pitchFamily="2" charset="2"/>
+              <a:buChar char="v"/>
+            </a:pPr>
+            <a:r>
+              <a:rPr lang="en-US" dirty="0"/>
+              <a:t>Data Transformation: Use Hive's SQL-like language, HiveQL, to perform various data transformations and aggregations. we calculated statistics, filter data by date, tournament, or teams, and perform other necessary preprocessing.</a:t>
+            </a:r>
+          </a:p>
+          <a:p>
+            <a:pPr marL="578358" lvl="1" indent="-285750">
+              <a:buFont typeface="Wingdings" panose="05000000000000000000" pitchFamily="2" charset="2"/>
+              <a:buChar char="v"/>
+            </a:pPr>
+            <a:endParaRPr lang="en-US" dirty="0"/>
+          </a:p>
+          <a:p>
+            <a:pPr marL="578358" lvl="1" indent="-285750">
+              <a:buFont typeface="Wingdings" panose="05000000000000000000" pitchFamily="2" charset="2"/>
+              <a:buChar char="v"/>
+            </a:pPr>
+            <a:r>
+              <a:rPr lang="en-US" dirty="0"/>
+              <a:t>Querying: We ran Hive queries to extract insights from the data. For example, we found the countries with the most international goals, city and country organizing most games, the pattern of football match in international tournament, and more.</a:t>
+            </a:r>
+          </a:p>
+        </p:txBody>
+      </p:sp>
     </p:spTree>
     <p:extLst>
       <p:ext uri="{BB962C8B-B14F-4D97-AF65-F5344CB8AC3E}">
-        <p14:creationId xmlns:p14="http://schemas.microsoft.com/office/powerpoint/2010/main" val="377270333"/>
+        <p14:creationId xmlns:p14="http://schemas.microsoft.com/office/powerpoint/2010/main" val="2104492924"/>
       </p:ext>
     </p:extLst>
   </p:cSld>
@@ -4713,7 +4582,7 @@
           <a:p>
             <a:r>
               <a:rPr lang="en-US" dirty="0"/>
-              <a:t>Demo steps (Continue..)</a:t>
+              <a:t>Demo steps (Demo project related)</a:t>
             </a:r>
           </a:p>
         </p:txBody>
@@ -4741,292 +4610,15 @@
             </a:pPr>
             <a:r>
               <a:rPr lang="en-GB" dirty="0"/>
-              <a:t>Create the log directories that we configured:</a:t>
-            </a:r>
-          </a:p>
-          <a:p>
-            <a:pPr marL="578358" lvl="1" indent="-285750">
-              <a:buFont typeface="Wingdings" panose="05000000000000000000" pitchFamily="2" charset="2"/>
-              <a:buChar char="v"/>
-            </a:pPr>
-            <a:endParaRPr lang="en-GB" dirty="0"/>
-          </a:p>
-          <a:p>
-            <a:pPr marL="578358" lvl="1" indent="-285750">
-              <a:buFont typeface="Wingdings" panose="05000000000000000000" pitchFamily="2" charset="2"/>
-              <a:buChar char="v"/>
-            </a:pPr>
-            <a:endParaRPr lang="en-GB" dirty="0"/>
-          </a:p>
-          <a:p>
-            <a:pPr marL="578358" lvl="1" indent="-285750">
-              <a:buFont typeface="Wingdings" panose="05000000000000000000" pitchFamily="2" charset="2"/>
-              <a:buChar char="v"/>
-            </a:pPr>
-            <a:endParaRPr lang="en-GB" dirty="0"/>
-          </a:p>
-          <a:p>
-            <a:pPr marL="578358" lvl="1" indent="-285750">
-              <a:buFont typeface="Wingdings" panose="05000000000000000000" pitchFamily="2" charset="2"/>
-              <a:buChar char="v"/>
-            </a:pPr>
-            <a:endParaRPr lang="en-GB" dirty="0"/>
-          </a:p>
-          <a:p>
-            <a:pPr marL="578358" lvl="1" indent="-285750">
-              <a:buFont typeface="Wingdings" panose="05000000000000000000" pitchFamily="2" charset="2"/>
-              <a:buChar char="v"/>
-            </a:pPr>
-            <a:endParaRPr lang="en-GB" dirty="0"/>
-          </a:p>
-          <a:p>
-            <a:pPr marL="578358" lvl="1" indent="-285750">
-              <a:buFont typeface="Wingdings" panose="05000000000000000000" pitchFamily="2" charset="2"/>
-              <a:buChar char="v"/>
-            </a:pPr>
-            <a:r>
-              <a:rPr lang="en-US" dirty="0"/>
-              <a:t>Finally, we can start the broker instances. Run the below three commands on different terminal sessions:</a:t>
-            </a:r>
-          </a:p>
-          <a:p>
-            <a:pPr marL="578358" lvl="1" indent="-285750">
-              <a:buFont typeface="Wingdings" panose="05000000000000000000" pitchFamily="2" charset="2"/>
-              <a:buChar char="v"/>
-            </a:pPr>
-            <a:endParaRPr lang="en-US" dirty="0"/>
-          </a:p>
-        </p:txBody>
-      </p:sp>
-      <p:graphicFrame>
-        <p:nvGraphicFramePr>
-          <p:cNvPr id="4" name="Table 3"/>
-          <p:cNvGraphicFramePr>
-            <a:graphicFrameLocks noGrp="1"/>
-          </p:cNvGraphicFramePr>
-          <p:nvPr>
-            <p:extLst>
-              <p:ext uri="{D42A27DB-BD31-4B8C-83A1-F6EECF244321}">
-                <p14:modId xmlns:p14="http://schemas.microsoft.com/office/powerpoint/2010/main" val="2158612300"/>
-              </p:ext>
-            </p:extLst>
-          </p:nvPr>
-        </p:nvGraphicFramePr>
-        <p:xfrm>
-          <a:off x="1499565" y="2270674"/>
-          <a:ext cx="8128000" cy="1188720"/>
-        </p:xfrm>
-        <a:graphic>
-          <a:graphicData uri="http://schemas.openxmlformats.org/drawingml/2006/table">
-            <a:tbl>
-              <a:tblPr firstRow="1" bandRow="1">
-                <a:tableStyleId>{D7AC3CCA-C797-4891-BE02-D94E43425B78}</a:tableStyleId>
-              </a:tblPr>
-              <a:tblGrid>
-                <a:gridCol w="8128000">
-                  <a:extLst>
-                    <a:ext uri="{9D8B030D-6E8A-4147-A177-3AD203B41FA5}">
-                      <a16:colId xmlns:a16="http://schemas.microsoft.com/office/drawing/2014/main" val="20000"/>
-                    </a:ext>
-                  </a:extLst>
-                </a:gridCol>
-              </a:tblGrid>
-              <a:tr h="370840">
-                <a:tc>
-                  <a:txBody>
-                    <a:bodyPr/>
-                    <a:lstStyle/>
-                    <a:p>
-                      <a:pPr marL="292608" lvl="1" indent="0">
-                        <a:buNone/>
-                      </a:pPr>
-                      <a:r>
-                        <a:rPr lang="en-US" dirty="0" err="1"/>
-                        <a:t>mkdir</a:t>
-                      </a:r>
-                      <a:r>
-                        <a:rPr lang="en-US" dirty="0"/>
-                        <a:t> /</a:t>
-                      </a:r>
-                      <a:r>
-                        <a:rPr lang="en-US" dirty="0" err="1"/>
-                        <a:t>tmp</a:t>
-                      </a:r>
-                      <a:r>
-                        <a:rPr lang="en-US" dirty="0"/>
-                        <a:t>/kafka-logs1 </a:t>
-                      </a:r>
-                    </a:p>
-                    <a:p>
-                      <a:pPr marL="292608" lvl="1" indent="0">
-                        <a:buNone/>
-                      </a:pPr>
-                      <a:r>
-                        <a:rPr lang="en-US" dirty="0" err="1"/>
-                        <a:t>mkdir</a:t>
-                      </a:r>
-                      <a:r>
-                        <a:rPr lang="en-US" dirty="0"/>
-                        <a:t> /</a:t>
-                      </a:r>
-                      <a:r>
-                        <a:rPr lang="en-US" dirty="0" err="1"/>
-                        <a:t>tmp</a:t>
-                      </a:r>
-                      <a:r>
-                        <a:rPr lang="en-US" dirty="0"/>
-                        <a:t>/kafka-logs2</a:t>
-                      </a:r>
-                    </a:p>
-                    <a:p>
-                      <a:pPr marL="292608" lvl="1" indent="0">
-                        <a:buNone/>
-                      </a:pPr>
-                      <a:r>
-                        <a:rPr lang="en-US" dirty="0" err="1"/>
-                        <a:t>mkdir</a:t>
-                      </a:r>
-                      <a:r>
-                        <a:rPr lang="en-US" dirty="0"/>
-                        <a:t> /</a:t>
-                      </a:r>
-                      <a:r>
-                        <a:rPr lang="en-US" dirty="0" err="1"/>
-                        <a:t>tmp</a:t>
-                      </a:r>
-                      <a:r>
-                        <a:rPr lang="en-US" dirty="0"/>
-                        <a:t>/kafka-logs3</a:t>
-                      </a:r>
-                    </a:p>
-                    <a:p>
-                      <a:endParaRPr lang="en-US" dirty="0"/>
-                    </a:p>
-                  </a:txBody>
-                  <a:tcPr/>
-                </a:tc>
-                <a:extLst>
-                  <a:ext uri="{0D108BD9-81ED-4DB2-BD59-A6C34878D82A}">
-                    <a16:rowId xmlns:a16="http://schemas.microsoft.com/office/drawing/2014/main" val="10000"/>
-                  </a:ext>
-                </a:extLst>
-              </a:tr>
-            </a:tbl>
-          </a:graphicData>
-        </a:graphic>
-      </p:graphicFrame>
-      <p:graphicFrame>
-        <p:nvGraphicFramePr>
-          <p:cNvPr id="6" name="Table 5"/>
-          <p:cNvGraphicFramePr>
-            <a:graphicFrameLocks noGrp="1"/>
-          </p:cNvGraphicFramePr>
-          <p:nvPr>
-            <p:extLst>
-              <p:ext uri="{D42A27DB-BD31-4B8C-83A1-F6EECF244321}">
-                <p14:modId xmlns:p14="http://schemas.microsoft.com/office/powerpoint/2010/main" val="2433124544"/>
-              </p:ext>
-            </p:extLst>
-          </p:nvPr>
-        </p:nvGraphicFramePr>
-        <p:xfrm>
-          <a:off x="1557438" y="4400415"/>
-          <a:ext cx="8128000" cy="1188720"/>
-        </p:xfrm>
-        <a:graphic>
-          <a:graphicData uri="http://schemas.openxmlformats.org/drawingml/2006/table">
-            <a:tbl>
-              <a:tblPr firstRow="1" bandRow="1">
-                <a:tableStyleId>{D7AC3CCA-C797-4891-BE02-D94E43425B78}</a:tableStyleId>
-              </a:tblPr>
-              <a:tblGrid>
-                <a:gridCol w="8128000">
-                  <a:extLst>
-                    <a:ext uri="{9D8B030D-6E8A-4147-A177-3AD203B41FA5}">
-                      <a16:colId xmlns:a16="http://schemas.microsoft.com/office/drawing/2014/main" val="20000"/>
-                    </a:ext>
-                  </a:extLst>
-                </a:gridCol>
-              </a:tblGrid>
-              <a:tr h="370840">
-                <a:tc>
-                  <a:txBody>
-                    <a:bodyPr/>
-                    <a:lstStyle/>
-                    <a:p>
-                      <a:pPr marL="292608" lvl="1" indent="0">
-                        <a:buFont typeface="Wingdings" panose="05000000000000000000" pitchFamily="2" charset="2"/>
-                        <a:buNone/>
-                      </a:pPr>
-                      <a:r>
-                        <a:rPr lang="en-US" dirty="0"/>
-                        <a:t>bin/kafka-server-start.sh </a:t>
-                      </a:r>
-                      <a:r>
-                        <a:rPr lang="en-US" dirty="0" err="1"/>
-                        <a:t>config</a:t>
-                      </a:r>
-                      <a:r>
-                        <a:rPr lang="en-US" dirty="0"/>
-                        <a:t>/server.1.properties</a:t>
-                      </a:r>
-                    </a:p>
-                    <a:p>
-                      <a:pPr marL="292608" lvl="1" indent="0">
-                        <a:buFont typeface="Wingdings" panose="05000000000000000000" pitchFamily="2" charset="2"/>
-                        <a:buNone/>
-                      </a:pPr>
-                      <a:r>
-                        <a:rPr lang="en-US" dirty="0"/>
-                        <a:t>bin/kafka-server-start.sh </a:t>
-                      </a:r>
-                      <a:r>
-                        <a:rPr lang="en-US" dirty="0" err="1"/>
-                        <a:t>config</a:t>
-                      </a:r>
-                      <a:r>
-                        <a:rPr lang="en-US" dirty="0"/>
-                        <a:t>/server.2.properties</a:t>
-                      </a:r>
-                    </a:p>
-                    <a:p>
-                      <a:pPr marL="292608" lvl="1" indent="0">
-                        <a:buFont typeface="Wingdings" panose="05000000000000000000" pitchFamily="2" charset="2"/>
-                        <a:buNone/>
-                      </a:pPr>
-                      <a:r>
-                        <a:rPr lang="en-US" dirty="0"/>
-                        <a:t>bin/kafka-server-start.sh </a:t>
-                      </a:r>
-                      <a:r>
-                        <a:rPr lang="en-US" dirty="0" err="1"/>
-                        <a:t>config</a:t>
-                      </a:r>
-                      <a:r>
-                        <a:rPr lang="en-US" dirty="0"/>
-                        <a:t>/server.3.properties</a:t>
-                      </a:r>
-                    </a:p>
-                    <a:p>
-                      <a:endParaRPr lang="en-US" dirty="0"/>
-                    </a:p>
-                  </a:txBody>
-                  <a:tcPr/>
-                </a:tc>
-                <a:extLst>
-                  <a:ext uri="{0D108BD9-81ED-4DB2-BD59-A6C34878D82A}">
-                    <a16:rowId xmlns:a16="http://schemas.microsoft.com/office/drawing/2014/main" val="10000"/>
-                  </a:ext>
-                </a:extLst>
-              </a:tr>
-            </a:tbl>
-          </a:graphicData>
-        </a:graphic>
-      </p:graphicFrame>
+              <a:t>Please add details here</a:t>
+            </a:r>
+          </a:p>
+        </p:txBody>
+      </p:sp>
     </p:spTree>
     <p:extLst>
       <p:ext uri="{BB962C8B-B14F-4D97-AF65-F5344CB8AC3E}">
-        <p14:creationId xmlns:p14="http://schemas.microsoft.com/office/powerpoint/2010/main" val="2719457588"/>
+        <p14:creationId xmlns:p14="http://schemas.microsoft.com/office/powerpoint/2010/main" val="876892857"/>
       </p:ext>
     </p:extLst>
   </p:cSld>
@@ -5070,7 +4662,7 @@
           <a:p>
             <a:r>
               <a:rPr lang="en-US" dirty="0"/>
-              <a:t>Demo steps (Continue..)</a:t>
+              <a:t>Future tasks</a:t>
             </a:r>
           </a:p>
         </p:txBody>
@@ -5092,13 +4684,28 @@
           </a:bodyPr>
           <a:lstStyle/>
           <a:p>
-            <a:pPr>
-              <a:buFont typeface="Wingdings" panose="05000000000000000000" pitchFamily="2" charset="2"/>
-              <a:buChar char="v"/>
+            <a:pPr marL="292608" lvl="1" indent="0">
+              <a:buNone/>
             </a:pPr>
             <a:r>
-              <a:rPr lang="en-US" dirty="0"/>
-              <a:t>Creating Topics</a:t>
+              <a:rPr lang="en-US" b="1" i="0" dirty="0">
+                <a:solidFill>
+                  <a:srgbClr val="1F2328"/>
+                </a:solidFill>
+                <a:effectLst/>
+                <a:latin typeface="-apple-system"/>
+              </a:rPr>
+              <a:t>Output and Visualization:</a:t>
+            </a:r>
+            <a:r>
+              <a:rPr lang="en-US" b="0" i="0" dirty="0">
+                <a:solidFill>
+                  <a:srgbClr val="1F2328"/>
+                </a:solidFill>
+                <a:effectLst/>
+                <a:latin typeface="-apple-system"/>
+              </a:rPr>
+              <a:t> </a:t>
             </a:r>
           </a:p>
           <a:p>
@@ -5106,117 +4713,92 @@
               <a:buFont typeface="Wingdings" panose="05000000000000000000" pitchFamily="2" charset="2"/>
               <a:buChar char="v"/>
             </a:pPr>
-            <a:endParaRPr lang="en-GB" dirty="0"/>
+            <a:r>
+              <a:rPr lang="en-US" b="0" i="0" dirty="0">
+                <a:solidFill>
+                  <a:srgbClr val="1F2328"/>
+                </a:solidFill>
+                <a:effectLst/>
+                <a:latin typeface="-apple-system"/>
+              </a:rPr>
+              <a:t>We planned to do visualization of some statistics.</a:t>
+            </a:r>
           </a:p>
           <a:p>
             <a:pPr marL="578358" lvl="1" indent="-285750">
               <a:buFont typeface="Wingdings" panose="05000000000000000000" pitchFamily="2" charset="2"/>
               <a:buChar char="v"/>
             </a:pPr>
-            <a:endParaRPr lang="en-GB" dirty="0"/>
+            <a:r>
+              <a:rPr lang="en-US" b="0" i="0" dirty="0">
+                <a:solidFill>
+                  <a:srgbClr val="1F2328"/>
+                </a:solidFill>
+                <a:effectLst/>
+                <a:latin typeface="-apple-system"/>
+              </a:rPr>
+              <a:t> However, due to time constraints, we were not able to do it. </a:t>
+            </a:r>
           </a:p>
           <a:p>
             <a:pPr marL="578358" lvl="1" indent="-285750">
               <a:buFont typeface="Wingdings" panose="05000000000000000000" pitchFamily="2" charset="2"/>
               <a:buChar char="v"/>
             </a:pPr>
-            <a:endParaRPr lang="en-GB" dirty="0"/>
+            <a:r>
+              <a:rPr lang="en-US" b="0" i="0" dirty="0">
+                <a:solidFill>
+                  <a:srgbClr val="1F2328"/>
+                </a:solidFill>
+                <a:effectLst/>
+                <a:latin typeface="-apple-system"/>
+              </a:rPr>
+              <a:t>In future, We plan to visualize the real-time data and insights using data visualization tools like Apache Zeppelin, </a:t>
+            </a:r>
+            <a:r>
+              <a:rPr lang="en-US" b="0" i="0" dirty="0" err="1">
+                <a:solidFill>
+                  <a:srgbClr val="1F2328"/>
+                </a:solidFill>
+                <a:effectLst/>
+                <a:latin typeface="-apple-system"/>
+              </a:rPr>
+              <a:t>Jupyter</a:t>
+            </a:r>
+            <a:r>
+              <a:rPr lang="en-US" b="0" i="0" dirty="0">
+                <a:solidFill>
+                  <a:srgbClr val="1F2328"/>
+                </a:solidFill>
+                <a:effectLst/>
+                <a:latin typeface="-apple-system"/>
+              </a:rPr>
+              <a:t> Notebook, or custom dashboards. </a:t>
+            </a:r>
           </a:p>
           <a:p>
             <a:pPr marL="578358" lvl="1" indent="-285750">
               <a:buFont typeface="Wingdings" panose="05000000000000000000" pitchFamily="2" charset="2"/>
               <a:buChar char="v"/>
             </a:pPr>
+            <a:r>
+              <a:rPr lang="en-US" b="0" i="0" dirty="0">
+                <a:solidFill>
+                  <a:srgbClr val="1F2328"/>
+                </a:solidFill>
+                <a:effectLst/>
+                <a:latin typeface="-apple-system"/>
+              </a:rPr>
+              <a:t>This can help us provide live updates to football enthusiasts.</a:t>
+            </a:r>
             <a:endParaRPr lang="en-GB" dirty="0"/>
           </a:p>
-          <a:p>
-            <a:pPr marL="578358" lvl="1" indent="-285750">
-              <a:buFont typeface="Wingdings" panose="05000000000000000000" pitchFamily="2" charset="2"/>
-              <a:buChar char="v"/>
-            </a:pPr>
-            <a:endParaRPr lang="en-GB" dirty="0"/>
-          </a:p>
-        </p:txBody>
-      </p:sp>
-      <p:graphicFrame>
-        <p:nvGraphicFramePr>
-          <p:cNvPr id="4" name="Table 3"/>
-          <p:cNvGraphicFramePr>
-            <a:graphicFrameLocks noGrp="1"/>
-          </p:cNvGraphicFramePr>
-          <p:nvPr>
-            <p:extLst>
-              <p:ext uri="{D42A27DB-BD31-4B8C-83A1-F6EECF244321}">
-                <p14:modId xmlns:p14="http://schemas.microsoft.com/office/powerpoint/2010/main" val="1860623370"/>
-              </p:ext>
-            </p:extLst>
-          </p:nvPr>
-        </p:nvGraphicFramePr>
-        <p:xfrm>
-          <a:off x="1296365" y="2316972"/>
-          <a:ext cx="9016678" cy="1463040"/>
-        </p:xfrm>
-        <a:graphic>
-          <a:graphicData uri="http://schemas.openxmlformats.org/drawingml/2006/table">
-            <a:tbl>
-              <a:tblPr firstRow="1" bandRow="1">
-                <a:tableStyleId>{D7AC3CCA-C797-4891-BE02-D94E43425B78}</a:tableStyleId>
-              </a:tblPr>
-              <a:tblGrid>
-                <a:gridCol w="9016678">
-                  <a:extLst>
-                    <a:ext uri="{9D8B030D-6E8A-4147-A177-3AD203B41FA5}">
-                      <a16:colId xmlns:a16="http://schemas.microsoft.com/office/drawing/2014/main" val="20000"/>
-                    </a:ext>
-                  </a:extLst>
-                </a:gridCol>
-              </a:tblGrid>
-              <a:tr h="370840">
-                <a:tc>
-                  <a:txBody>
-                    <a:bodyPr/>
-                    <a:lstStyle/>
-                    <a:p>
-                      <a:pPr marL="292608" lvl="1" indent="0">
-                        <a:buNone/>
-                      </a:pPr>
-                      <a:r>
-                        <a:rPr lang="en-US" dirty="0"/>
-                        <a:t>bin/kafka-topics.sh --create --topic TWEET --bootstrap-server localhost:9093 --partitions 3 --replication-factor 2</a:t>
-                      </a:r>
-                    </a:p>
-                    <a:p>
-                      <a:pPr marL="292608" lvl="1" indent="0">
-                        <a:buNone/>
-                      </a:pPr>
-                      <a:endParaRPr lang="en-US" dirty="0"/>
-                    </a:p>
-                    <a:p>
-                      <a:pPr marL="292608" lvl="1" indent="0">
-                        <a:buNone/>
-                      </a:pPr>
-                      <a:r>
-                        <a:rPr lang="en-US" dirty="0"/>
-                        <a:t>bin/kafka-topics.sh --create --topic TWEET_HBASE --bootstrap-server localhost:9093 --partitions 3 --replication-factor 2</a:t>
-                      </a:r>
-                    </a:p>
-                  </a:txBody>
-                  <a:tcPr/>
-                </a:tc>
-                <a:extLst>
-                  <a:ext uri="{0D108BD9-81ED-4DB2-BD59-A6C34878D82A}">
-                    <a16:rowId xmlns:a16="http://schemas.microsoft.com/office/drawing/2014/main" val="10000"/>
-                  </a:ext>
-                </a:extLst>
-              </a:tr>
-            </a:tbl>
-          </a:graphicData>
-        </a:graphic>
-      </p:graphicFrame>
+        </p:txBody>
+      </p:sp>
     </p:spTree>
     <p:extLst>
       <p:ext uri="{BB962C8B-B14F-4D97-AF65-F5344CB8AC3E}">
-        <p14:creationId xmlns:p14="http://schemas.microsoft.com/office/powerpoint/2010/main" val="94966729"/>
+        <p14:creationId xmlns:p14="http://schemas.microsoft.com/office/powerpoint/2010/main" val="1986697089"/>
       </p:ext>
     </p:extLst>
   </p:cSld>
@@ -5227,188 +4809,6 @@
 </file>
 
 <file path=ppt/slides/slide14.xml><?xml version="1.0" encoding="utf-8"?>
-<p:sld xmlns:a="http://schemas.openxmlformats.org/drawingml/2006/main" xmlns:r="http://schemas.openxmlformats.org/officeDocument/2006/relationships" xmlns:p="http://schemas.openxmlformats.org/presentationml/2006/main">
-  <p:cSld>
-    <p:spTree>
-      <p:nvGrpSpPr>
-        <p:cNvPr id="1" name=""/>
-        <p:cNvGrpSpPr/>
-        <p:nvPr/>
-      </p:nvGrpSpPr>
-      <p:grpSpPr>
-        <a:xfrm>
-          <a:off x="0" y="0"/>
-          <a:ext cx="0" cy="0"/>
-          <a:chOff x="0" y="0"/>
-          <a:chExt cx="0" cy="0"/>
-        </a:xfrm>
-      </p:grpSpPr>
-      <p:sp>
-        <p:nvSpPr>
-          <p:cNvPr id="2" name="Title 1"/>
-          <p:cNvSpPr>
-            <a:spLocks noGrp="1"/>
-          </p:cNvSpPr>
-          <p:nvPr>
-            <p:ph type="title"/>
-          </p:nvPr>
-        </p:nvSpPr>
-        <p:spPr/>
-        <p:txBody>
-          <a:bodyPr/>
-          <a:lstStyle/>
-          <a:p>
-            <a:r>
-              <a:rPr lang="en-US" dirty="0"/>
-              <a:t>Demo steps (Continue..)</a:t>
-            </a:r>
-          </a:p>
-        </p:txBody>
-      </p:sp>
-      <p:sp>
-        <p:nvSpPr>
-          <p:cNvPr id="3" name="Content Placeholder 2"/>
-          <p:cNvSpPr>
-            <a:spLocks noGrp="1"/>
-          </p:cNvSpPr>
-          <p:nvPr>
-            <p:ph idx="1"/>
-          </p:nvPr>
-        </p:nvSpPr>
-        <p:spPr/>
-        <p:txBody>
-          <a:bodyPr>
-            <a:normAutofit/>
-          </a:bodyPr>
-          <a:lstStyle/>
-          <a:p>
-            <a:pPr marL="292608" lvl="1" indent="0">
-              <a:buNone/>
-            </a:pPr>
-            <a:r>
-              <a:rPr lang="en-GB" b="1" dirty="0"/>
-              <a:t>Step 3: </a:t>
-            </a:r>
-          </a:p>
-          <a:p>
-            <a:pPr marL="578358" lvl="1" indent="-285750">
-              <a:buFont typeface="Wingdings" panose="05000000000000000000" pitchFamily="2" charset="2"/>
-              <a:buChar char="v"/>
-            </a:pPr>
-            <a:r>
-              <a:rPr lang="en-GB" dirty="0"/>
-              <a:t>Run the Twitter Kafka Producer Application</a:t>
-            </a:r>
-          </a:p>
-          <a:p>
-            <a:pPr marL="578358" lvl="1" indent="-285750">
-              <a:buFont typeface="Wingdings" panose="05000000000000000000" pitchFamily="2" charset="2"/>
-              <a:buChar char="v"/>
-            </a:pPr>
-            <a:r>
-              <a:rPr lang="en-GB" dirty="0"/>
-              <a:t>It fetches tweets from twitter API and produce to Kafka cluster on topic TWEET</a:t>
-            </a:r>
-          </a:p>
-          <a:p>
-            <a:pPr marL="292608" lvl="1" indent="0">
-              <a:buNone/>
-            </a:pPr>
-            <a:r>
-              <a:rPr lang="en-GB" b="1" dirty="0"/>
-              <a:t>Step 4: </a:t>
-            </a:r>
-          </a:p>
-          <a:p>
-            <a:pPr marL="578358" lvl="1" indent="-285750">
-              <a:buFont typeface="Wingdings" panose="05000000000000000000" pitchFamily="2" charset="2"/>
-              <a:buChar char="v"/>
-            </a:pPr>
-            <a:r>
-              <a:rPr lang="en-GB" dirty="0"/>
-              <a:t>Run the Spark Kafka Application(Spark Streaming)  which aggregation/filter tweets and produce Kafka cluster on topic TWEET_HBASE</a:t>
-            </a:r>
-          </a:p>
-          <a:p>
-            <a:pPr marL="292608" lvl="1" indent="0">
-              <a:buNone/>
-            </a:pPr>
-            <a:r>
-              <a:rPr lang="en-GB" b="1" dirty="0"/>
-              <a:t>Step 5: </a:t>
-            </a:r>
-          </a:p>
-          <a:p>
-            <a:pPr marL="578358" lvl="1" indent="-285750">
-              <a:buFont typeface="Wingdings" panose="05000000000000000000" pitchFamily="2" charset="2"/>
-              <a:buChar char="v"/>
-            </a:pPr>
-            <a:r>
-              <a:rPr lang="en-GB" dirty="0"/>
-              <a:t>Run the twitter-</a:t>
-            </a:r>
-            <a:r>
-              <a:rPr lang="en-GB" dirty="0" err="1"/>
-              <a:t>hbase</a:t>
-            </a:r>
-            <a:r>
-              <a:rPr lang="en-GB" dirty="0"/>
-              <a:t> which store process data to </a:t>
-            </a:r>
-            <a:r>
-              <a:rPr lang="en-GB" dirty="0" err="1"/>
-              <a:t>HBase</a:t>
-            </a:r>
-            <a:r>
-              <a:rPr lang="en-GB" dirty="0"/>
-              <a:t> </a:t>
-            </a:r>
-            <a:r>
-              <a:rPr lang="en-GB" dirty="0" err="1"/>
-              <a:t>datastore</a:t>
-            </a:r>
-            <a:r>
-              <a:rPr lang="en-GB" dirty="0"/>
-              <a:t>.</a:t>
-            </a:r>
-          </a:p>
-          <a:p>
-            <a:pPr marL="578358" lvl="1" indent="-285750">
-              <a:buFont typeface="Wingdings" panose="05000000000000000000" pitchFamily="2" charset="2"/>
-              <a:buChar char="v"/>
-            </a:pPr>
-            <a:endParaRPr lang="en-GB" dirty="0"/>
-          </a:p>
-          <a:p>
-            <a:pPr marL="578358" lvl="1" indent="-285750">
-              <a:buFont typeface="Wingdings" panose="05000000000000000000" pitchFamily="2" charset="2"/>
-              <a:buChar char="v"/>
-            </a:pPr>
-            <a:endParaRPr lang="en-GB" dirty="0"/>
-          </a:p>
-          <a:p>
-            <a:pPr marL="578358" lvl="1" indent="-285750">
-              <a:buFont typeface="Wingdings" panose="05000000000000000000" pitchFamily="2" charset="2"/>
-              <a:buChar char="v"/>
-            </a:pPr>
-            <a:endParaRPr lang="en-GB" dirty="0"/>
-          </a:p>
-        </p:txBody>
-      </p:sp>
-    </p:spTree>
-    <p:extLst>
-      <p:ext uri="{BB962C8B-B14F-4D97-AF65-F5344CB8AC3E}">
-        <p14:creationId xmlns:p14="http://schemas.microsoft.com/office/powerpoint/2010/main" val="876892857"/>
-      </p:ext>
-    </p:extLst>
-  </p:cSld>
-  <p:clrMapOvr>
-    <a:masterClrMapping/>
-  </p:clrMapOvr>
-</p:sld>
-</file>
-
-<file path=ppt/slides/slide15.xml><?xml version="1.0" encoding="utf-8"?>
 <p:sld xmlns:a="http://schemas.openxmlformats.org/drawingml/2006/main" xmlns:r="http://schemas.openxmlformats.org/officeDocument/2006/relationships" xmlns:p="http://schemas.openxmlformats.org/presentationml/2006/main">
   <p:cSld>
     <p:spTree>
@@ -5638,7 +5038,11 @@
           <a:p>
             <a:r>
               <a:rPr lang="en-GB" b="1" dirty="0"/>
-              <a:t>HBase: </a:t>
+              <a:t>Hive/</a:t>
+            </a:r>
+            <a:r>
+              <a:rPr lang="en-GB" b="1"/>
+              <a:t>Hbase: </a:t>
             </a:r>
             <a:r>
               <a:rPr lang="en-GB" dirty="0"/>
@@ -5708,28 +5112,220 @@
           </a:p>
         </p:txBody>
       </p:sp>
-      <p:sp>
-        <p:nvSpPr>
-          <p:cNvPr id="4" name="Content Placeholder 3">
+      <p:pic>
+        <p:nvPicPr>
+          <p:cNvPr id="1026" name="Picture 2">
             <a:extLst>
               <a:ext uri="{FF2B5EF4-FFF2-40B4-BE49-F238E27FC236}">
-                <a16:creationId xmlns:a16="http://schemas.microsoft.com/office/drawing/2014/main" id="{B26F1612-9D4F-94EF-252A-59837DE09E8B}"/>
+                <a16:creationId xmlns:a16="http://schemas.microsoft.com/office/drawing/2014/main" id="{416CD072-E197-EC06-A9FC-A2E68B9C4FFB}"/>
               </a:ext>
             </a:extLst>
           </p:cNvPr>
-          <p:cNvSpPr>
-            <a:spLocks noGrp="1"/>
-          </p:cNvSpPr>
+          <p:cNvPicPr>
+            <a:picLocks noGrp="1" noChangeAspect="1" noChangeArrowheads="1"/>
+          </p:cNvPicPr>
           <p:nvPr>
             <p:ph idx="1"/>
           </p:nvPr>
-        </p:nvSpPr>
-        <p:spPr/>
-        <p:txBody>
-          <a:bodyPr/>
+        </p:nvPicPr>
+        <p:blipFill rotWithShape="1">
+          <a:blip r:embed="rId2">
+            <a:extLst>
+              <a:ext uri="{28A0092B-C50C-407E-A947-70E740481C1C}">
+                <a14:useLocalDpi xmlns:a14="http://schemas.microsoft.com/office/drawing/2010/main" val="0"/>
+              </a:ext>
+            </a:extLst>
+          </a:blip>
+          <a:srcRect l="37932"/>
+          <a:stretch/>
+        </p:blipFill>
+        <p:spPr bwMode="auto">
+          <a:xfrm>
+            <a:off x="5172075" y="1846263"/>
+            <a:ext cx="4907004" cy="4022725"/>
+          </a:xfrm>
+          <a:prstGeom prst="rect">
+            <a:avLst/>
+          </a:prstGeom>
+          <a:noFill/>
+          <a:extLst>
+            <a:ext uri="{909E8E84-426E-40DD-AFC4-6F175D3DCCD1}">
+              <a14:hiddenFill xmlns:a14="http://schemas.microsoft.com/office/drawing/2010/main">
+                <a:solidFill>
+                  <a:srgbClr val="FFFFFF"/>
+                </a:solidFill>
+              </a14:hiddenFill>
+            </a:ext>
+          </a:extLst>
+        </p:spPr>
+      </p:pic>
+      <p:sp>
+        <p:nvSpPr>
+          <p:cNvPr id="5" name="TextBox 4">
+            <a:extLst>
+              <a:ext uri="{FF2B5EF4-FFF2-40B4-BE49-F238E27FC236}">
+                <a16:creationId xmlns:a16="http://schemas.microsoft.com/office/drawing/2014/main" id="{08C57BB6-616E-8413-827B-81BEA23E6729}"/>
+              </a:ext>
+            </a:extLst>
+          </p:cNvPr>
+          <p:cNvSpPr txBox="1"/>
+          <p:nvPr/>
+        </p:nvSpPr>
+        <p:spPr>
+          <a:xfrm>
+            <a:off x="2800350" y="2781300"/>
+            <a:ext cx="2865119" cy="369332"/>
+          </a:xfrm>
+          <a:prstGeom prst="rect">
+            <a:avLst/>
+          </a:prstGeom>
+          <a:noFill/>
+        </p:spPr>
+        <p:txBody>
+          <a:bodyPr wrap="square" rtlCol="0">
+            <a:spAutoFit/>
+          </a:bodyPr>
           <a:lstStyle/>
           <a:p>
+            <a:r>
+              <a:rPr lang="en-US" dirty="0"/>
+              <a:t>Input data from </a:t>
+            </a:r>
+            <a:r>
+              <a:rPr lang="en-US" dirty="0" err="1"/>
+              <a:t>kaggle</a:t>
+            </a:r>
+            <a:endParaRPr lang="en-US" dirty="0"/>
+          </a:p>
+        </p:txBody>
+      </p:sp>
+      <p:sp>
+        <p:nvSpPr>
+          <p:cNvPr id="8" name="Arrow: Right 7">
+            <a:extLst>
+              <a:ext uri="{FF2B5EF4-FFF2-40B4-BE49-F238E27FC236}">
+                <a16:creationId xmlns:a16="http://schemas.microsoft.com/office/drawing/2014/main" id="{E840C392-B3E5-8D4B-B29E-139AFE03D9E3}"/>
+              </a:ext>
+            </a:extLst>
+          </p:cNvPr>
+          <p:cNvSpPr/>
+          <p:nvPr/>
+        </p:nvSpPr>
+        <p:spPr>
+          <a:xfrm rot="10800000">
+            <a:off x="5057583" y="4973215"/>
+            <a:ext cx="737119" cy="205275"/>
+          </a:xfrm>
+          <a:prstGeom prst="rightArrow">
+            <a:avLst/>
+          </a:prstGeom>
+          <a:solidFill>
+            <a:schemeClr val="bg2">
+              <a:lumMod val="75000"/>
+            </a:schemeClr>
+          </a:solidFill>
+          <a:ln>
+            <a:noFill/>
+          </a:ln>
+        </p:spPr>
+        <p:style>
+          <a:lnRef idx="2">
+            <a:schemeClr val="accent1">
+              <a:shade val="15000"/>
+            </a:schemeClr>
+          </a:lnRef>
+          <a:fillRef idx="1">
+            <a:schemeClr val="accent1"/>
+          </a:fillRef>
+          <a:effectRef idx="0">
+            <a:schemeClr val="accent1"/>
+          </a:effectRef>
+          <a:fontRef idx="minor">
+            <a:schemeClr val="lt1"/>
+          </a:fontRef>
+        </p:style>
+        <p:txBody>
+          <a:bodyPr rtlCol="0" anchor="ctr"/>
+          <a:lstStyle/>
+          <a:p>
+            <a:pPr algn="ctr"/>
             <a:endParaRPr lang="en-US"/>
+          </a:p>
+        </p:txBody>
+      </p:sp>
+      <p:sp>
+        <p:nvSpPr>
+          <p:cNvPr id="10" name="TextBox 9">
+            <a:extLst>
+              <a:ext uri="{FF2B5EF4-FFF2-40B4-BE49-F238E27FC236}">
+                <a16:creationId xmlns:a16="http://schemas.microsoft.com/office/drawing/2014/main" id="{A2D62D9B-D07E-ED61-317A-490EF3EC4371}"/>
+              </a:ext>
+            </a:extLst>
+          </p:cNvPr>
+          <p:cNvSpPr txBox="1"/>
+          <p:nvPr/>
+        </p:nvSpPr>
+        <p:spPr>
+          <a:xfrm>
+            <a:off x="3080094" y="4511550"/>
+            <a:ext cx="1920241" cy="923330"/>
+          </a:xfrm>
+          <a:prstGeom prst="rect">
+            <a:avLst/>
+          </a:prstGeom>
+          <a:noFill/>
+        </p:spPr>
+        <p:txBody>
+          <a:bodyPr wrap="square">
+            <a:spAutoFit/>
+          </a:bodyPr>
+          <a:lstStyle/>
+          <a:p>
+            <a:r>
+              <a:rPr lang="en-US" b="0" i="0" dirty="0">
+                <a:solidFill>
+                  <a:srgbClr val="1F2328"/>
+                </a:solidFill>
+                <a:effectLst/>
+                <a:latin typeface="-apple-system"/>
+              </a:rPr>
+              <a:t>Apache Zeppelin, </a:t>
+            </a:r>
+          </a:p>
+          <a:p>
+            <a:r>
+              <a:rPr lang="en-US" b="0" i="0" dirty="0" err="1">
+                <a:solidFill>
+                  <a:srgbClr val="1F2328"/>
+                </a:solidFill>
+                <a:effectLst/>
+                <a:latin typeface="-apple-system"/>
+              </a:rPr>
+              <a:t>Jupyter</a:t>
+            </a:r>
+            <a:r>
+              <a:rPr lang="en-US" b="0" i="0" dirty="0">
+                <a:solidFill>
+                  <a:srgbClr val="1F2328"/>
+                </a:solidFill>
+                <a:effectLst/>
+                <a:latin typeface="-apple-system"/>
+              </a:rPr>
+              <a:t> Notebook, </a:t>
+            </a:r>
+          </a:p>
+          <a:p>
+            <a:r>
+              <a:rPr lang="en-US" b="0" i="0" dirty="0">
+                <a:solidFill>
+                  <a:srgbClr val="1F2328"/>
+                </a:solidFill>
+                <a:effectLst/>
+                <a:latin typeface="-apple-system"/>
+              </a:rPr>
+              <a:t>Tableau</a:t>
+            </a:r>
+            <a:endParaRPr lang="en-US" dirty="0"/>
           </a:p>
         </p:txBody>
       </p:sp>

</xml_diff>

<commit_message>
Project presentation file update
</commit_message>
<xml_diff>
--- a/Final Project-SoccorAnalyser-Group4.pptx
+++ b/Final Project-SoccorAnalyser-Group4.pptx
@@ -352,7 +352,7 @@
             <a:fld id="{B61BEF0D-F0BB-DE4B-95CE-6DB70DBA9567}" type="datetimeFigureOut">
               <a:rPr lang="en-US" smtClean="0"/>
               <a:pPr/>
-              <a:t>9/27/2023</a:t>
+              <a:t>9/30/2023</a:t>
             </a:fld>
             <a:endParaRPr lang="en-US" dirty="0"/>
           </a:p>
@@ -562,7 +562,7 @@
             <a:fld id="{B61BEF0D-F0BB-DE4B-95CE-6DB70DBA9567}" type="datetimeFigureOut">
               <a:rPr lang="en-US" smtClean="0"/>
               <a:pPr/>
-              <a:t>9/27/2023</a:t>
+              <a:t>9/30/2023</a:t>
             </a:fld>
             <a:endParaRPr lang="en-US" dirty="0"/>
           </a:p>
@@ -820,7 +820,7 @@
             <a:fld id="{B61BEF0D-F0BB-DE4B-95CE-6DB70DBA9567}" type="datetimeFigureOut">
               <a:rPr lang="en-US" smtClean="0"/>
               <a:pPr/>
-              <a:t>9/27/2023</a:t>
+              <a:t>9/30/2023</a:t>
             </a:fld>
             <a:endParaRPr lang="en-US" dirty="0"/>
           </a:p>
@@ -996,7 +996,7 @@
             <a:fld id="{B61BEF0D-F0BB-DE4B-95CE-6DB70DBA9567}" type="datetimeFigureOut">
               <a:rPr lang="en-US" smtClean="0"/>
               <a:pPr/>
-              <a:t>9/27/2023</a:t>
+              <a:t>9/30/2023</a:t>
             </a:fld>
             <a:endParaRPr lang="en-US" dirty="0"/>
           </a:p>
@@ -1341,7 +1341,7 @@
             <a:fld id="{B61BEF0D-F0BB-DE4B-95CE-6DB70DBA9567}" type="datetimeFigureOut">
               <a:rPr lang="en-US" smtClean="0"/>
               <a:pPr/>
-              <a:t>9/27/2023</a:t>
+              <a:t>9/30/2023</a:t>
             </a:fld>
             <a:endParaRPr lang="en-US" dirty="0"/>
           </a:p>
@@ -1618,7 +1618,7 @@
             <a:fld id="{B61BEF0D-F0BB-DE4B-95CE-6DB70DBA9567}" type="datetimeFigureOut">
               <a:rPr lang="en-US" smtClean="0"/>
               <a:pPr/>
-              <a:t>9/27/2023</a:t>
+              <a:t>9/30/2023</a:t>
             </a:fld>
             <a:endParaRPr lang="en-US" dirty="0"/>
           </a:p>
@@ -1999,7 +1999,7 @@
             <a:fld id="{B61BEF0D-F0BB-DE4B-95CE-6DB70DBA9567}" type="datetimeFigureOut">
               <a:rPr lang="en-US" smtClean="0"/>
               <a:pPr/>
-              <a:t>9/27/2023</a:t>
+              <a:t>9/30/2023</a:t>
             </a:fld>
             <a:endParaRPr lang="en-US" dirty="0"/>
           </a:p>
@@ -2119,7 +2119,7 @@
             <a:fld id="{B61BEF0D-F0BB-DE4B-95CE-6DB70DBA9567}" type="datetimeFigureOut">
               <a:rPr lang="en-US" smtClean="0"/>
               <a:pPr/>
-              <a:t>9/27/2023</a:t>
+              <a:t>9/30/2023</a:t>
             </a:fld>
             <a:endParaRPr lang="en-US" dirty="0"/>
           </a:p>
@@ -2292,7 +2292,7 @@
             <a:fld id="{B61BEF0D-F0BB-DE4B-95CE-6DB70DBA9567}" type="datetimeFigureOut">
               <a:rPr lang="en-US" smtClean="0"/>
               <a:pPr/>
-              <a:t>9/27/2023</a:t>
+              <a:t>9/30/2023</a:t>
             </a:fld>
             <a:endParaRPr lang="en-US" dirty="0"/>
           </a:p>
@@ -2648,7 +2648,7 @@
             <a:fld id="{B61BEF0D-F0BB-DE4B-95CE-6DB70DBA9567}" type="datetimeFigureOut">
               <a:rPr lang="en-US" smtClean="0"/>
               <a:pPr/>
-              <a:t>9/27/2023</a:t>
+              <a:t>9/30/2023</a:t>
             </a:fld>
             <a:endParaRPr lang="en-US" dirty="0"/>
           </a:p>
@@ -3032,7 +3032,7 @@
             <a:fld id="{B61BEF0D-F0BB-DE4B-95CE-6DB70DBA9567}" type="datetimeFigureOut">
               <a:rPr lang="en-US" smtClean="0"/>
               <a:pPr/>
-              <a:t>9/27/2023</a:t>
+              <a:t>9/30/2023</a:t>
             </a:fld>
             <a:endParaRPr lang="en-US" dirty="0"/>
           </a:p>
@@ -3321,7 +3321,7 @@
             <a:fld id="{B61BEF0D-F0BB-DE4B-95CE-6DB70DBA9567}" type="datetimeFigureOut">
               <a:rPr lang="en-US" smtClean="0"/>
               <a:pPr/>
-              <a:t>9/27/2023</a:t>
+              <a:t>9/30/2023</a:t>
             </a:fld>
             <a:endParaRPr lang="en-US" dirty="0"/>
           </a:p>
@@ -4773,7 +4773,7 @@
                 <a:effectLst/>
                 <a:latin typeface="-apple-system"/>
               </a:rPr>
-              <a:t> Notebook, or custom dashboards. </a:t>
+              <a:t> Notebook, or Tableau(connect with Cloudera Hadoop using ODBC client and fetching data from the Hive Tables)​. </a:t>
             </a:r>
           </a:p>
           <a:p>

</xml_diff>

<commit_message>
Configuration and presentation file changes
</commit_message>
<xml_diff>
--- a/Final Project-SoccorAnalyser-Group4.pptx
+++ b/Final Project-SoccorAnalyser-Group4.pptx
@@ -16,9 +16,10 @@
     <p:sldId id="264" r:id="rId10"/>
     <p:sldId id="265" r:id="rId11"/>
     <p:sldId id="271" r:id="rId12"/>
-    <p:sldId id="269" r:id="rId13"/>
-    <p:sldId id="272" r:id="rId14"/>
-    <p:sldId id="270" r:id="rId15"/>
+    <p:sldId id="273" r:id="rId13"/>
+    <p:sldId id="269" r:id="rId14"/>
+    <p:sldId id="272" r:id="rId15"/>
+    <p:sldId id="270" r:id="rId16"/>
   </p:sldIdLst>
   <p:sldSz cx="12192000" cy="6858000"/>
   <p:notesSz cx="6858000" cy="9144000"/>
@@ -352,7 +353,7 @@
             <a:fld id="{B61BEF0D-F0BB-DE4B-95CE-6DB70DBA9567}" type="datetimeFigureOut">
               <a:rPr lang="en-US" smtClean="0"/>
               <a:pPr/>
-              <a:t>9/30/2023</a:t>
+              <a:t>10/1/2023</a:t>
             </a:fld>
             <a:endParaRPr lang="en-US" dirty="0"/>
           </a:p>
@@ -562,7 +563,7 @@
             <a:fld id="{B61BEF0D-F0BB-DE4B-95CE-6DB70DBA9567}" type="datetimeFigureOut">
               <a:rPr lang="en-US" smtClean="0"/>
               <a:pPr/>
-              <a:t>9/30/2023</a:t>
+              <a:t>10/1/2023</a:t>
             </a:fld>
             <a:endParaRPr lang="en-US" dirty="0"/>
           </a:p>
@@ -820,7 +821,7 @@
             <a:fld id="{B61BEF0D-F0BB-DE4B-95CE-6DB70DBA9567}" type="datetimeFigureOut">
               <a:rPr lang="en-US" smtClean="0"/>
               <a:pPr/>
-              <a:t>9/30/2023</a:t>
+              <a:t>10/1/2023</a:t>
             </a:fld>
             <a:endParaRPr lang="en-US" dirty="0"/>
           </a:p>
@@ -996,7 +997,7 @@
             <a:fld id="{B61BEF0D-F0BB-DE4B-95CE-6DB70DBA9567}" type="datetimeFigureOut">
               <a:rPr lang="en-US" smtClean="0"/>
               <a:pPr/>
-              <a:t>9/30/2023</a:t>
+              <a:t>10/1/2023</a:t>
             </a:fld>
             <a:endParaRPr lang="en-US" dirty="0"/>
           </a:p>
@@ -1341,7 +1342,7 @@
             <a:fld id="{B61BEF0D-F0BB-DE4B-95CE-6DB70DBA9567}" type="datetimeFigureOut">
               <a:rPr lang="en-US" smtClean="0"/>
               <a:pPr/>
-              <a:t>9/30/2023</a:t>
+              <a:t>10/1/2023</a:t>
             </a:fld>
             <a:endParaRPr lang="en-US" dirty="0"/>
           </a:p>
@@ -1618,7 +1619,7 @@
             <a:fld id="{B61BEF0D-F0BB-DE4B-95CE-6DB70DBA9567}" type="datetimeFigureOut">
               <a:rPr lang="en-US" smtClean="0"/>
               <a:pPr/>
-              <a:t>9/30/2023</a:t>
+              <a:t>10/1/2023</a:t>
             </a:fld>
             <a:endParaRPr lang="en-US" dirty="0"/>
           </a:p>
@@ -1999,7 +2000,7 @@
             <a:fld id="{B61BEF0D-F0BB-DE4B-95CE-6DB70DBA9567}" type="datetimeFigureOut">
               <a:rPr lang="en-US" smtClean="0"/>
               <a:pPr/>
-              <a:t>9/30/2023</a:t>
+              <a:t>10/1/2023</a:t>
             </a:fld>
             <a:endParaRPr lang="en-US" dirty="0"/>
           </a:p>
@@ -2119,7 +2120,7 @@
             <a:fld id="{B61BEF0D-F0BB-DE4B-95CE-6DB70DBA9567}" type="datetimeFigureOut">
               <a:rPr lang="en-US" smtClean="0"/>
               <a:pPr/>
-              <a:t>9/30/2023</a:t>
+              <a:t>10/1/2023</a:t>
             </a:fld>
             <a:endParaRPr lang="en-US" dirty="0"/>
           </a:p>
@@ -2292,7 +2293,7 @@
             <a:fld id="{B61BEF0D-F0BB-DE4B-95CE-6DB70DBA9567}" type="datetimeFigureOut">
               <a:rPr lang="en-US" smtClean="0"/>
               <a:pPr/>
-              <a:t>9/30/2023</a:t>
+              <a:t>10/1/2023</a:t>
             </a:fld>
             <a:endParaRPr lang="en-US" dirty="0"/>
           </a:p>
@@ -2648,7 +2649,7 @@
             <a:fld id="{B61BEF0D-F0BB-DE4B-95CE-6DB70DBA9567}" type="datetimeFigureOut">
               <a:rPr lang="en-US" smtClean="0"/>
               <a:pPr/>
-              <a:t>9/30/2023</a:t>
+              <a:t>10/1/2023</a:t>
             </a:fld>
             <a:endParaRPr lang="en-US" dirty="0"/>
           </a:p>
@@ -3032,7 +3033,7 @@
             <a:fld id="{B61BEF0D-F0BB-DE4B-95CE-6DB70DBA9567}" type="datetimeFigureOut">
               <a:rPr lang="en-US" smtClean="0"/>
               <a:pPr/>
-              <a:t>9/30/2023</a:t>
+              <a:t>10/1/2023</a:t>
             </a:fld>
             <a:endParaRPr lang="en-US" dirty="0"/>
           </a:p>
@@ -3321,7 +3322,7 @@
             <a:fld id="{B61BEF0D-F0BB-DE4B-95CE-6DB70DBA9567}" type="datetimeFigureOut">
               <a:rPr lang="en-US" smtClean="0"/>
               <a:pPr/>
-              <a:t>9/30/2023</a:t>
+              <a:t>10/1/2023</a:t>
             </a:fld>
             <a:endParaRPr lang="en-US" dirty="0"/>
           </a:p>
@@ -4582,7 +4583,7 @@
           <a:p>
             <a:r>
               <a:rPr lang="en-US" dirty="0"/>
-              <a:t>Demo steps (Demo project related)</a:t>
+              <a:t>Project execution steps</a:t>
             </a:r>
           </a:p>
         </p:txBody>
@@ -4604,21 +4605,111 @@
           </a:bodyPr>
           <a:lstStyle/>
           <a:p>
+            <a:pPr marL="292608" lvl="1" indent="0">
+              <a:buNone/>
+            </a:pPr>
+            <a:r>
+              <a:rPr lang="en-GB" sz="3600" b="1" dirty="0"/>
+              <a:t>Step 5(</a:t>
+            </a:r>
+            <a:r>
+              <a:rPr lang="en-US" sz="3600" b="1" i="0" dirty="0">
+                <a:solidFill>
+                  <a:srgbClr val="1F2328"/>
+                </a:solidFill>
+                <a:effectLst/>
+                <a:latin typeface="-apple-system"/>
+              </a:rPr>
+              <a:t>Data Export to HBase</a:t>
+            </a:r>
+            <a:r>
+              <a:rPr lang="en-GB" sz="3600" b="1" dirty="0"/>
+              <a:t>):</a:t>
+            </a:r>
+          </a:p>
+          <a:p>
             <a:pPr marL="578358" lvl="1" indent="-285750">
               <a:buFont typeface="Wingdings" panose="05000000000000000000" pitchFamily="2" charset="2"/>
               <a:buChar char="v"/>
             </a:pPr>
             <a:r>
-              <a:rPr lang="en-GB" dirty="0"/>
-              <a:t>Please add details here</a:t>
-            </a:r>
+              <a:rPr lang="en-US" sz="2400" b="0" i="0" dirty="0">
+                <a:solidFill>
+                  <a:srgbClr val="1F2328"/>
+                </a:solidFill>
+                <a:effectLst/>
+                <a:latin typeface="-apple-system"/>
+              </a:rPr>
+              <a:t>For the demonstration, the aggregate </a:t>
+            </a:r>
+            <a:r>
+              <a:rPr lang="en-US" sz="2400" b="0" i="0" dirty="0" err="1">
+                <a:solidFill>
+                  <a:srgbClr val="1F2328"/>
+                </a:solidFill>
+                <a:effectLst/>
+                <a:latin typeface="-apple-system"/>
+              </a:rPr>
+              <a:t>soccor</a:t>
+            </a:r>
+            <a:r>
+              <a:rPr lang="en-US" sz="2400" b="0" i="0" dirty="0">
+                <a:solidFill>
+                  <a:srgbClr val="1F2328"/>
+                </a:solidFill>
+                <a:effectLst/>
+                <a:latin typeface="-apple-system"/>
+              </a:rPr>
+              <a:t> result is exported in HBase table </a:t>
+            </a:r>
+            <a:r>
+              <a:rPr lang="en-US" sz="2400" b="0" i="0" dirty="0" err="1">
+                <a:solidFill>
+                  <a:srgbClr val="1F2328"/>
+                </a:solidFill>
+                <a:effectLst/>
+                <a:latin typeface="-apple-system"/>
+              </a:rPr>
+              <a:t>SoccorScoreTable</a:t>
+            </a:r>
+            <a:r>
+              <a:rPr lang="en-US" sz="2400" b="0" i="0" dirty="0">
+                <a:solidFill>
+                  <a:srgbClr val="1F2328"/>
+                </a:solidFill>
+                <a:effectLst/>
+                <a:latin typeface="-apple-system"/>
+              </a:rPr>
+              <a:t>. Every aggregated result from RDD partitions are saved to HBase column-family for use case1 </a:t>
+            </a:r>
+            <a:r>
+              <a:rPr lang="en-US" sz="2400" b="0" i="0" dirty="0" err="1">
+                <a:solidFill>
+                  <a:srgbClr val="1F2328"/>
+                </a:solidFill>
+                <a:effectLst/>
+                <a:latin typeface="-apple-system"/>
+              </a:rPr>
+              <a:t>soccor</a:t>
+            </a:r>
+            <a:r>
+              <a:rPr lang="en-US" sz="2400" b="0" i="0" dirty="0">
+                <a:solidFill>
+                  <a:srgbClr val="1F2328"/>
+                </a:solidFill>
+                <a:effectLst/>
+                <a:latin typeface="-apple-system"/>
+              </a:rPr>
+              <a:t> result.</a:t>
+            </a:r>
+            <a:endParaRPr lang="en-US" sz="2400" dirty="0"/>
           </a:p>
         </p:txBody>
       </p:sp>
     </p:spTree>
     <p:extLst>
       <p:ext uri="{BB962C8B-B14F-4D97-AF65-F5344CB8AC3E}">
-        <p14:creationId xmlns:p14="http://schemas.microsoft.com/office/powerpoint/2010/main" val="876892857"/>
+        <p14:creationId xmlns:p14="http://schemas.microsoft.com/office/powerpoint/2010/main" val="1613140926"/>
       </p:ext>
     </p:extLst>
   </p:cSld>
@@ -4662,6 +4753,86 @@
           <a:p>
             <a:r>
               <a:rPr lang="en-US" dirty="0"/>
+              <a:t>Demo steps (Demo project related)</a:t>
+            </a:r>
+          </a:p>
+        </p:txBody>
+      </p:sp>
+      <p:sp>
+        <p:nvSpPr>
+          <p:cNvPr id="3" name="Content Placeholder 2"/>
+          <p:cNvSpPr>
+            <a:spLocks noGrp="1"/>
+          </p:cNvSpPr>
+          <p:nvPr>
+            <p:ph idx="1"/>
+          </p:nvPr>
+        </p:nvSpPr>
+        <p:spPr/>
+        <p:txBody>
+          <a:bodyPr>
+            <a:normAutofit/>
+          </a:bodyPr>
+          <a:lstStyle/>
+          <a:p>
+            <a:pPr marL="578358" lvl="1" indent="-285750">
+              <a:buFont typeface="Wingdings" panose="05000000000000000000" pitchFamily="2" charset="2"/>
+              <a:buChar char="v"/>
+            </a:pPr>
+            <a:r>
+              <a:rPr lang="en-GB" dirty="0"/>
+              <a:t>Please add details here</a:t>
+            </a:r>
+          </a:p>
+        </p:txBody>
+      </p:sp>
+    </p:spTree>
+    <p:extLst>
+      <p:ext uri="{BB962C8B-B14F-4D97-AF65-F5344CB8AC3E}">
+        <p14:creationId xmlns:p14="http://schemas.microsoft.com/office/powerpoint/2010/main" val="876892857"/>
+      </p:ext>
+    </p:extLst>
+  </p:cSld>
+  <p:clrMapOvr>
+    <a:masterClrMapping/>
+  </p:clrMapOvr>
+</p:sld>
+</file>
+
+<file path=ppt/slides/slide14.xml><?xml version="1.0" encoding="utf-8"?>
+<p:sld xmlns:a="http://schemas.openxmlformats.org/drawingml/2006/main" xmlns:r="http://schemas.openxmlformats.org/officeDocument/2006/relationships" xmlns:p="http://schemas.openxmlformats.org/presentationml/2006/main">
+  <p:cSld>
+    <p:spTree>
+      <p:nvGrpSpPr>
+        <p:cNvPr id="1" name=""/>
+        <p:cNvGrpSpPr/>
+        <p:nvPr/>
+      </p:nvGrpSpPr>
+      <p:grpSpPr>
+        <a:xfrm>
+          <a:off x="0" y="0"/>
+          <a:ext cx="0" cy="0"/>
+          <a:chOff x="0" y="0"/>
+          <a:chExt cx="0" cy="0"/>
+        </a:xfrm>
+      </p:grpSpPr>
+      <p:sp>
+        <p:nvSpPr>
+          <p:cNvPr id="2" name="Title 1"/>
+          <p:cNvSpPr>
+            <a:spLocks noGrp="1"/>
+          </p:cNvSpPr>
+          <p:nvPr>
+            <p:ph type="title"/>
+          </p:nvPr>
+        </p:nvSpPr>
+        <p:spPr/>
+        <p:txBody>
+          <a:bodyPr/>
+          <a:lstStyle/>
+          <a:p>
+            <a:r>
+              <a:rPr lang="en-US" dirty="0"/>
               <a:t>Future tasks</a:t>
             </a:r>
           </a:p>
@@ -4808,7 +4979,7 @@
 </p:sld>
 </file>
 
-<file path=ppt/slides/slide14.xml><?xml version="1.0" encoding="utf-8"?>
+<file path=ppt/slides/slide15.xml><?xml version="1.0" encoding="utf-8"?>
 <p:sld xmlns:a="http://schemas.openxmlformats.org/drawingml/2006/main" xmlns:r="http://schemas.openxmlformats.org/officeDocument/2006/relationships" xmlns:p="http://schemas.openxmlformats.org/presentationml/2006/main">
   <p:cSld>
     <p:spTree>
@@ -5329,6 +5500,36 @@
           </a:p>
         </p:txBody>
       </p:sp>
+      <p:pic>
+        <p:nvPicPr>
+          <p:cNvPr id="4" name="Picture 3">
+            <a:extLst>
+              <a:ext uri="{FF2B5EF4-FFF2-40B4-BE49-F238E27FC236}">
+                <a16:creationId xmlns:a16="http://schemas.microsoft.com/office/drawing/2014/main" id="{ED526D3B-B90C-80DD-522D-2907CF6A7B76}"/>
+              </a:ext>
+            </a:extLst>
+          </p:cNvPr>
+          <p:cNvPicPr>
+            <a:picLocks noChangeAspect="1"/>
+          </p:cNvPicPr>
+          <p:nvPr/>
+        </p:nvPicPr>
+        <p:blipFill>
+          <a:blip r:embed="rId3"/>
+          <a:stretch>
+            <a:fillRect/>
+          </a:stretch>
+        </p:blipFill>
+        <p:spPr>
+          <a:xfrm>
+            <a:off x="7847827" y="2595561"/>
+            <a:ext cx="1684166" cy="1386960"/>
+          </a:xfrm>
+          <a:prstGeom prst="rect">
+            <a:avLst/>
+          </a:prstGeom>
+        </p:spPr>
+      </p:pic>
     </p:spTree>
     <p:extLst>
       <p:ext uri="{BB962C8B-B14F-4D97-AF65-F5344CB8AC3E}">
@@ -5466,7 +5667,17 @@
             </a:r>
             <a:r>
               <a:rPr lang="en-GB" dirty="0"/>
-              <a:t>/Hive – xxx</a:t>
+              <a:t>- 2.2.5</a:t>
+            </a:r>
+          </a:p>
+          <a:p>
+            <a:pPr lvl="1">
+              <a:buFont typeface="Wingdings" panose="05000000000000000000" pitchFamily="2" charset="2"/>
+              <a:buChar char="v"/>
+            </a:pPr>
+            <a:r>
+              <a:rPr lang="en-GB" dirty="0"/>
+              <a:t>Hive – xxx</a:t>
             </a:r>
             <a:endParaRPr lang="en-US" dirty="0"/>
           </a:p>
@@ -7092,15 +7303,7 @@
             </a:pPr>
             <a:r>
               <a:rPr lang="en-GB" dirty="0"/>
-              <a:t>The output data from spark (aggregated) is persist in </a:t>
-            </a:r>
-            <a:r>
-              <a:rPr lang="en-GB" dirty="0" err="1"/>
-              <a:t>Hbase</a:t>
-            </a:r>
-            <a:r>
-              <a:rPr lang="en-GB" dirty="0"/>
-              <a:t>/Hive database</a:t>
+              <a:t>The output data from spark (aggregated) is persist in HBase/Hive database</a:t>
             </a:r>
           </a:p>
           <a:p>

</xml_diff>